<commit_message>
Added powerpoint outline. Prepped README to be filled out
</commit_message>
<xml_diff>
--- a/Lesson 4: Troubleshooting/Troubleshooting.pptx
+++ b/Lesson 4: Troubleshooting/Troubleshooting.pptx
@@ -9,16 +9,22 @@
   </p:notesMasterIdLst>
   <p:sldIdLst>
     <p:sldId id="256" r:id="rId6"/>
+    <p:sldId id="257" r:id="rId7"/>
+    <p:sldId id="258" r:id="rId8"/>
+    <p:sldId id="259" r:id="rId9"/>
+    <p:sldId id="260" r:id="rId10"/>
+    <p:sldId id="261" r:id="rId11"/>
+    <p:sldId id="262" r:id="rId12"/>
   </p:sldIdLst>
   <p:sldSz cy="5143500" cx="9144000"/>
   <p:notesSz cx="6858000" cy="9144000"/>
   <p:embeddedFontLst>
     <p:embeddedFont>
-      <p:font typeface="Proxima Nova"/>
-      <p:regular r:id="rId7"/>
-      <p:bold r:id="rId8"/>
-      <p:italic r:id="rId9"/>
-      <p:boldItalic r:id="rId10"/>
+      <p:font typeface="Roboto Serif"/>
+      <p:regular r:id="rId13"/>
+      <p:bold r:id="rId14"/>
+      <p:italic r:id="rId15"/>
+      <p:boldItalic r:id="rId16"/>
     </p:embeddedFont>
   </p:embeddedFontLst>
   <p:defaultTextStyle>
@@ -700,6 +706,105 @@
   <p:cSld>
     <p:spTree>
       <p:nvGrpSpPr>
+        <p:cNvPr id="50" name="Shape 50"/>
+        <p:cNvGrpSpPr/>
+        <p:nvPr/>
+      </p:nvGrpSpPr>
+      <p:grpSpPr>
+        <a:xfrm>
+          <a:off x="0" y="0"/>
+          <a:ext cx="0" cy="0"/>
+          <a:chOff x="0" y="0"/>
+          <a:chExt cx="0" cy="0"/>
+        </a:xfrm>
+      </p:grpSpPr>
+      <p:sp>
+        <p:nvSpPr>
+          <p:cNvPr id="51" name="Google Shape;51;g18fd8a630f9_0_11:notes"/>
+          <p:cNvSpPr/>
+          <p:nvPr>
+            <p:ph idx="2" type="sldImg"/>
+          </p:nvPr>
+        </p:nvSpPr>
+        <p:spPr>
+          <a:xfrm>
+            <a:off x="381300" y="685800"/>
+            <a:ext cx="6096000" cy="3429000"/>
+          </a:xfrm>
+          <a:custGeom>
+            <a:rect b="b" l="l" r="r" t="t"/>
+            <a:pathLst>
+              <a:path extrusionOk="0" h="120000" w="120000">
+                <a:moveTo>
+                  <a:pt x="0" y="0"/>
+                </a:moveTo>
+                <a:lnTo>
+                  <a:pt x="120000" y="0"/>
+                </a:lnTo>
+                <a:lnTo>
+                  <a:pt x="120000" y="120000"/>
+                </a:lnTo>
+                <a:lnTo>
+                  <a:pt x="0" y="120000"/>
+                </a:lnTo>
+                <a:close/>
+              </a:path>
+            </a:pathLst>
+          </a:custGeom>
+        </p:spPr>
+      </p:sp>
+      <p:sp>
+        <p:nvSpPr>
+          <p:cNvPr id="52" name="Google Shape;52;g18fd8a630f9_0_11:notes"/>
+          <p:cNvSpPr txBox="1"/>
+          <p:nvPr>
+            <p:ph idx="1" type="body"/>
+          </p:nvPr>
+        </p:nvSpPr>
+        <p:spPr>
+          <a:xfrm>
+            <a:off x="685800" y="4343400"/>
+            <a:ext cx="5486400" cy="4114800"/>
+          </a:xfrm>
+          <a:prstGeom prst="rect">
+            <a:avLst/>
+          </a:prstGeom>
+        </p:spPr>
+        <p:txBody>
+          <a:bodyPr anchorCtr="0" anchor="t" bIns="91425" lIns="91425" spcFirstLastPara="1" rIns="91425" wrap="square" tIns="91425">
+            <a:noAutofit/>
+          </a:bodyPr>
+          <a:lstStyle/>
+          <a:p>
+            <a:pPr indent="0" lvl="0" marL="0" rtl="0" algn="l">
+              <a:spcBef>
+                <a:spcPts val="0"/>
+              </a:spcBef>
+              <a:spcAft>
+                <a:spcPts val="0"/>
+              </a:spcAft>
+              <a:buNone/>
+            </a:pPr>
+            <a:r>
+              <a:t/>
+            </a:r>
+            <a:endParaRPr/>
+          </a:p>
+        </p:txBody>
+      </p:sp>
+    </p:spTree>
+  </p:cSld>
+  <p:clrMapOvr>
+    <a:masterClrMapping/>
+  </p:clrMapOvr>
+</p:notes>
+</file>
+
+<file path=ppt/notesSlides/notesSlide2.xml><?xml version="1.0" encoding="utf-8"?>
+<p:notes xmlns:a="http://schemas.openxmlformats.org/drawingml/2006/main" xmlns:r="http://schemas.openxmlformats.org/officeDocument/2006/relationships" xmlns:mc="http://schemas.openxmlformats.org/markup-compatibility/2006" xmlns:mv="urn:schemas-microsoft-com:mac:vml" xmlns:p="http://schemas.openxmlformats.org/presentationml/2006/main" xmlns:c="http://schemas.openxmlformats.org/drawingml/2006/chart" xmlns:dgm="http://schemas.openxmlformats.org/drawingml/2006/diagram" xmlns:o="urn:schemas-microsoft-com:office:office" xmlns:v="urn:schemas-microsoft-com:vml" xmlns:pvml="urn:schemas-microsoft-com:office:powerpoint" xmlns:com="http://schemas.openxmlformats.org/drawingml/2006/compatibility" xmlns:p14="http://schemas.microsoft.com/office/powerpoint/2010/main" xmlns:p15="http://schemas.microsoft.com/office/powerpoint/2012/main" xmlns:ahyp="http://schemas.microsoft.com/office/drawing/2018/hyperlinkcolor" showMasterPhAnim="0" showMasterSp="0">
+  <p:cSld>
+    <p:spTree>
+      <p:nvGrpSpPr>
         <p:cNvPr id="55" name="Shape 55"/>
         <p:cNvGrpSpPr/>
         <p:nvPr/>
@@ -794,16 +899,504 @@
 </p:notes>
 </file>
 
+<file path=ppt/notesSlides/notesSlide3.xml><?xml version="1.0" encoding="utf-8"?>
+<p:notes xmlns:a="http://schemas.openxmlformats.org/drawingml/2006/main" xmlns:r="http://schemas.openxmlformats.org/officeDocument/2006/relationships" xmlns:mc="http://schemas.openxmlformats.org/markup-compatibility/2006" xmlns:mv="urn:schemas-microsoft-com:mac:vml" xmlns:p="http://schemas.openxmlformats.org/presentationml/2006/main" xmlns:c="http://schemas.openxmlformats.org/drawingml/2006/chart" xmlns:dgm="http://schemas.openxmlformats.org/drawingml/2006/diagram" xmlns:o="urn:schemas-microsoft-com:office:office" xmlns:v="urn:schemas-microsoft-com:vml" xmlns:pvml="urn:schemas-microsoft-com:office:powerpoint" xmlns:com="http://schemas.openxmlformats.org/drawingml/2006/compatibility" xmlns:p14="http://schemas.microsoft.com/office/powerpoint/2010/main" xmlns:p15="http://schemas.microsoft.com/office/powerpoint/2012/main" xmlns:ahyp="http://schemas.microsoft.com/office/drawing/2018/hyperlinkcolor" showMasterPhAnim="0" showMasterSp="0">
+  <p:cSld>
+    <p:spTree>
+      <p:nvGrpSpPr>
+        <p:cNvPr id="60" name="Shape 60"/>
+        <p:cNvGrpSpPr/>
+        <p:nvPr/>
+      </p:nvGrpSpPr>
+      <p:grpSpPr>
+        <a:xfrm>
+          <a:off x="0" y="0"/>
+          <a:ext cx="0" cy="0"/>
+          <a:chOff x="0" y="0"/>
+          <a:chExt cx="0" cy="0"/>
+        </a:xfrm>
+      </p:grpSpPr>
+      <p:sp>
+        <p:nvSpPr>
+          <p:cNvPr id="61" name="Google Shape;61;g18fd8a630f9_0_0:notes"/>
+          <p:cNvSpPr/>
+          <p:nvPr>
+            <p:ph idx="2" type="sldImg"/>
+          </p:nvPr>
+        </p:nvSpPr>
+        <p:spPr>
+          <a:xfrm>
+            <a:off x="381300" y="685800"/>
+            <a:ext cx="6096000" cy="3429000"/>
+          </a:xfrm>
+          <a:custGeom>
+            <a:rect b="b" l="l" r="r" t="t"/>
+            <a:pathLst>
+              <a:path extrusionOk="0" h="120000" w="120000">
+                <a:moveTo>
+                  <a:pt x="0" y="0"/>
+                </a:moveTo>
+                <a:lnTo>
+                  <a:pt x="120000" y="0"/>
+                </a:lnTo>
+                <a:lnTo>
+                  <a:pt x="120000" y="120000"/>
+                </a:lnTo>
+                <a:lnTo>
+                  <a:pt x="0" y="120000"/>
+                </a:lnTo>
+                <a:close/>
+              </a:path>
+            </a:pathLst>
+          </a:custGeom>
+        </p:spPr>
+      </p:sp>
+      <p:sp>
+        <p:nvSpPr>
+          <p:cNvPr id="62" name="Google Shape;62;g18fd8a630f9_0_0:notes"/>
+          <p:cNvSpPr txBox="1"/>
+          <p:nvPr>
+            <p:ph idx="1" type="body"/>
+          </p:nvPr>
+        </p:nvSpPr>
+        <p:spPr>
+          <a:xfrm>
+            <a:off x="685800" y="4343400"/>
+            <a:ext cx="5486400" cy="4114800"/>
+          </a:xfrm>
+          <a:prstGeom prst="rect">
+            <a:avLst/>
+          </a:prstGeom>
+        </p:spPr>
+        <p:txBody>
+          <a:bodyPr anchorCtr="0" anchor="t" bIns="91425" lIns="91425" spcFirstLastPara="1" rIns="91425" wrap="square" tIns="91425">
+            <a:noAutofit/>
+          </a:bodyPr>
+          <a:lstStyle/>
+          <a:p>
+            <a:pPr indent="0" lvl="0" marL="0" rtl="0" algn="l">
+              <a:spcBef>
+                <a:spcPts val="0"/>
+              </a:spcBef>
+              <a:spcAft>
+                <a:spcPts val="0"/>
+              </a:spcAft>
+              <a:buNone/>
+            </a:pPr>
+            <a:r>
+              <a:t/>
+            </a:r>
+            <a:endParaRPr/>
+          </a:p>
+        </p:txBody>
+      </p:sp>
+    </p:spTree>
+  </p:cSld>
+  <p:clrMapOvr>
+    <a:masterClrMapping/>
+  </p:clrMapOvr>
+</p:notes>
+</file>
+
+<file path=ppt/notesSlides/notesSlide4.xml><?xml version="1.0" encoding="utf-8"?>
+<p:notes xmlns:a="http://schemas.openxmlformats.org/drawingml/2006/main" xmlns:r="http://schemas.openxmlformats.org/officeDocument/2006/relationships" xmlns:mc="http://schemas.openxmlformats.org/markup-compatibility/2006" xmlns:mv="urn:schemas-microsoft-com:mac:vml" xmlns:p="http://schemas.openxmlformats.org/presentationml/2006/main" xmlns:c="http://schemas.openxmlformats.org/drawingml/2006/chart" xmlns:dgm="http://schemas.openxmlformats.org/drawingml/2006/diagram" xmlns:o="urn:schemas-microsoft-com:office:office" xmlns:v="urn:schemas-microsoft-com:vml" xmlns:pvml="urn:schemas-microsoft-com:office:powerpoint" xmlns:com="http://schemas.openxmlformats.org/drawingml/2006/compatibility" xmlns:p14="http://schemas.microsoft.com/office/powerpoint/2010/main" xmlns:p15="http://schemas.microsoft.com/office/powerpoint/2012/main" xmlns:ahyp="http://schemas.microsoft.com/office/drawing/2018/hyperlinkcolor" showMasterPhAnim="0" showMasterSp="0">
+  <p:cSld>
+    <p:spTree>
+      <p:nvGrpSpPr>
+        <p:cNvPr id="66" name="Shape 66"/>
+        <p:cNvGrpSpPr/>
+        <p:nvPr/>
+      </p:nvGrpSpPr>
+      <p:grpSpPr>
+        <a:xfrm>
+          <a:off x="0" y="0"/>
+          <a:ext cx="0" cy="0"/>
+          <a:chOff x="0" y="0"/>
+          <a:chExt cx="0" cy="0"/>
+        </a:xfrm>
+      </p:grpSpPr>
+      <p:sp>
+        <p:nvSpPr>
+          <p:cNvPr id="67" name="Google Shape;67;g18fd8a630f9_0_5:notes"/>
+          <p:cNvSpPr/>
+          <p:nvPr>
+            <p:ph idx="2" type="sldImg"/>
+          </p:nvPr>
+        </p:nvSpPr>
+        <p:spPr>
+          <a:xfrm>
+            <a:off x="381300" y="685800"/>
+            <a:ext cx="6096000" cy="3429000"/>
+          </a:xfrm>
+          <a:custGeom>
+            <a:rect b="b" l="l" r="r" t="t"/>
+            <a:pathLst>
+              <a:path extrusionOk="0" h="120000" w="120000">
+                <a:moveTo>
+                  <a:pt x="0" y="0"/>
+                </a:moveTo>
+                <a:lnTo>
+                  <a:pt x="120000" y="0"/>
+                </a:lnTo>
+                <a:lnTo>
+                  <a:pt x="120000" y="120000"/>
+                </a:lnTo>
+                <a:lnTo>
+                  <a:pt x="0" y="120000"/>
+                </a:lnTo>
+                <a:close/>
+              </a:path>
+            </a:pathLst>
+          </a:custGeom>
+        </p:spPr>
+      </p:sp>
+      <p:sp>
+        <p:nvSpPr>
+          <p:cNvPr id="68" name="Google Shape;68;g18fd8a630f9_0_5:notes"/>
+          <p:cNvSpPr txBox="1"/>
+          <p:nvPr>
+            <p:ph idx="1" type="body"/>
+          </p:nvPr>
+        </p:nvSpPr>
+        <p:spPr>
+          <a:xfrm>
+            <a:off x="685800" y="4343400"/>
+            <a:ext cx="5486400" cy="4114800"/>
+          </a:xfrm>
+          <a:prstGeom prst="rect">
+            <a:avLst/>
+          </a:prstGeom>
+        </p:spPr>
+        <p:txBody>
+          <a:bodyPr anchorCtr="0" anchor="t" bIns="91425" lIns="91425" spcFirstLastPara="1" rIns="91425" wrap="square" tIns="91425">
+            <a:noAutofit/>
+          </a:bodyPr>
+          <a:lstStyle/>
+          <a:p>
+            <a:pPr indent="0" lvl="0" marL="0" rtl="0" algn="l">
+              <a:spcBef>
+                <a:spcPts val="0"/>
+              </a:spcBef>
+              <a:spcAft>
+                <a:spcPts val="0"/>
+              </a:spcAft>
+              <a:buNone/>
+            </a:pPr>
+            <a:r>
+              <a:t/>
+            </a:r>
+            <a:endParaRPr/>
+          </a:p>
+        </p:txBody>
+      </p:sp>
+    </p:spTree>
+  </p:cSld>
+  <p:clrMapOvr>
+    <a:masterClrMapping/>
+  </p:clrMapOvr>
+</p:notes>
+</file>
+
+<file path=ppt/notesSlides/notesSlide5.xml><?xml version="1.0" encoding="utf-8"?>
+<p:notes xmlns:a="http://schemas.openxmlformats.org/drawingml/2006/main" xmlns:r="http://schemas.openxmlformats.org/officeDocument/2006/relationships" xmlns:mc="http://schemas.openxmlformats.org/markup-compatibility/2006" xmlns:mv="urn:schemas-microsoft-com:mac:vml" xmlns:p="http://schemas.openxmlformats.org/presentationml/2006/main" xmlns:c="http://schemas.openxmlformats.org/drawingml/2006/chart" xmlns:dgm="http://schemas.openxmlformats.org/drawingml/2006/diagram" xmlns:o="urn:schemas-microsoft-com:office:office" xmlns:v="urn:schemas-microsoft-com:vml" xmlns:pvml="urn:schemas-microsoft-com:office:powerpoint" xmlns:com="http://schemas.openxmlformats.org/drawingml/2006/compatibility" xmlns:p14="http://schemas.microsoft.com/office/powerpoint/2010/main" xmlns:p15="http://schemas.microsoft.com/office/powerpoint/2012/main" xmlns:ahyp="http://schemas.microsoft.com/office/drawing/2018/hyperlinkcolor" showMasterPhAnim="0" showMasterSp="0">
+  <p:cSld>
+    <p:spTree>
+      <p:nvGrpSpPr>
+        <p:cNvPr id="72" name="Shape 72"/>
+        <p:cNvGrpSpPr/>
+        <p:nvPr/>
+      </p:nvGrpSpPr>
+      <p:grpSpPr>
+        <a:xfrm>
+          <a:off x="0" y="0"/>
+          <a:ext cx="0" cy="0"/>
+          <a:chOff x="0" y="0"/>
+          <a:chExt cx="0" cy="0"/>
+        </a:xfrm>
+      </p:grpSpPr>
+      <p:sp>
+        <p:nvSpPr>
+          <p:cNvPr id="73" name="Google Shape;73;g18fd8a630f9_0_62:notes"/>
+          <p:cNvSpPr/>
+          <p:nvPr>
+            <p:ph idx="2" type="sldImg"/>
+          </p:nvPr>
+        </p:nvSpPr>
+        <p:spPr>
+          <a:xfrm>
+            <a:off x="381300" y="685800"/>
+            <a:ext cx="6096000" cy="3429000"/>
+          </a:xfrm>
+          <a:custGeom>
+            <a:rect b="b" l="l" r="r" t="t"/>
+            <a:pathLst>
+              <a:path extrusionOk="0" h="120000" w="120000">
+                <a:moveTo>
+                  <a:pt x="0" y="0"/>
+                </a:moveTo>
+                <a:lnTo>
+                  <a:pt x="120000" y="0"/>
+                </a:lnTo>
+                <a:lnTo>
+                  <a:pt x="120000" y="120000"/>
+                </a:lnTo>
+                <a:lnTo>
+                  <a:pt x="0" y="120000"/>
+                </a:lnTo>
+                <a:close/>
+              </a:path>
+            </a:pathLst>
+          </a:custGeom>
+        </p:spPr>
+      </p:sp>
+      <p:sp>
+        <p:nvSpPr>
+          <p:cNvPr id="74" name="Google Shape;74;g18fd8a630f9_0_62:notes"/>
+          <p:cNvSpPr txBox="1"/>
+          <p:nvPr>
+            <p:ph idx="1" type="body"/>
+          </p:nvPr>
+        </p:nvSpPr>
+        <p:spPr>
+          <a:xfrm>
+            <a:off x="685800" y="4343400"/>
+            <a:ext cx="5486400" cy="4114800"/>
+          </a:xfrm>
+          <a:prstGeom prst="rect">
+            <a:avLst/>
+          </a:prstGeom>
+        </p:spPr>
+        <p:txBody>
+          <a:bodyPr anchorCtr="0" anchor="t" bIns="91425" lIns="91425" spcFirstLastPara="1" rIns="91425" wrap="square" tIns="91425">
+            <a:noAutofit/>
+          </a:bodyPr>
+          <a:lstStyle/>
+          <a:p>
+            <a:pPr indent="0" lvl="0" marL="0" rtl="0" algn="l">
+              <a:spcBef>
+                <a:spcPts val="0"/>
+              </a:spcBef>
+              <a:spcAft>
+                <a:spcPts val="0"/>
+              </a:spcAft>
+              <a:buNone/>
+            </a:pPr>
+            <a:r>
+              <a:t/>
+            </a:r>
+            <a:endParaRPr/>
+          </a:p>
+        </p:txBody>
+      </p:sp>
+    </p:spTree>
+  </p:cSld>
+  <p:clrMapOvr>
+    <a:masterClrMapping/>
+  </p:clrMapOvr>
+</p:notes>
+</file>
+
+<file path=ppt/notesSlides/notesSlide6.xml><?xml version="1.0" encoding="utf-8"?>
+<p:notes xmlns:a="http://schemas.openxmlformats.org/drawingml/2006/main" xmlns:r="http://schemas.openxmlformats.org/officeDocument/2006/relationships" xmlns:mc="http://schemas.openxmlformats.org/markup-compatibility/2006" xmlns:mv="urn:schemas-microsoft-com:mac:vml" xmlns:p="http://schemas.openxmlformats.org/presentationml/2006/main" xmlns:c="http://schemas.openxmlformats.org/drawingml/2006/chart" xmlns:dgm="http://schemas.openxmlformats.org/drawingml/2006/diagram" xmlns:o="urn:schemas-microsoft-com:office:office" xmlns:v="urn:schemas-microsoft-com:vml" xmlns:pvml="urn:schemas-microsoft-com:office:powerpoint" xmlns:com="http://schemas.openxmlformats.org/drawingml/2006/compatibility" xmlns:p14="http://schemas.microsoft.com/office/powerpoint/2010/main" xmlns:p15="http://schemas.microsoft.com/office/powerpoint/2012/main" xmlns:ahyp="http://schemas.microsoft.com/office/drawing/2018/hyperlinkcolor" showMasterPhAnim="0" showMasterSp="0">
+  <p:cSld>
+    <p:spTree>
+      <p:nvGrpSpPr>
+        <p:cNvPr id="78" name="Shape 78"/>
+        <p:cNvGrpSpPr/>
+        <p:nvPr/>
+      </p:nvGrpSpPr>
+      <p:grpSpPr>
+        <a:xfrm>
+          <a:off x="0" y="0"/>
+          <a:ext cx="0" cy="0"/>
+          <a:chOff x="0" y="0"/>
+          <a:chExt cx="0" cy="0"/>
+        </a:xfrm>
+      </p:grpSpPr>
+      <p:sp>
+        <p:nvSpPr>
+          <p:cNvPr id="79" name="Google Shape;79;g18fd8a630f9_0_67:notes"/>
+          <p:cNvSpPr/>
+          <p:nvPr>
+            <p:ph idx="2" type="sldImg"/>
+          </p:nvPr>
+        </p:nvSpPr>
+        <p:spPr>
+          <a:xfrm>
+            <a:off x="381300" y="685800"/>
+            <a:ext cx="6096000" cy="3429000"/>
+          </a:xfrm>
+          <a:custGeom>
+            <a:rect b="b" l="l" r="r" t="t"/>
+            <a:pathLst>
+              <a:path extrusionOk="0" h="120000" w="120000">
+                <a:moveTo>
+                  <a:pt x="0" y="0"/>
+                </a:moveTo>
+                <a:lnTo>
+                  <a:pt x="120000" y="0"/>
+                </a:lnTo>
+                <a:lnTo>
+                  <a:pt x="120000" y="120000"/>
+                </a:lnTo>
+                <a:lnTo>
+                  <a:pt x="0" y="120000"/>
+                </a:lnTo>
+                <a:close/>
+              </a:path>
+            </a:pathLst>
+          </a:custGeom>
+        </p:spPr>
+      </p:sp>
+      <p:sp>
+        <p:nvSpPr>
+          <p:cNvPr id="80" name="Google Shape;80;g18fd8a630f9_0_67:notes"/>
+          <p:cNvSpPr txBox="1"/>
+          <p:nvPr>
+            <p:ph idx="1" type="body"/>
+          </p:nvPr>
+        </p:nvSpPr>
+        <p:spPr>
+          <a:xfrm>
+            <a:off x="685800" y="4343400"/>
+            <a:ext cx="5486400" cy="4114800"/>
+          </a:xfrm>
+          <a:prstGeom prst="rect">
+            <a:avLst/>
+          </a:prstGeom>
+        </p:spPr>
+        <p:txBody>
+          <a:bodyPr anchorCtr="0" anchor="t" bIns="91425" lIns="91425" spcFirstLastPara="1" rIns="91425" wrap="square" tIns="91425">
+            <a:noAutofit/>
+          </a:bodyPr>
+          <a:lstStyle/>
+          <a:p>
+            <a:pPr indent="0" lvl="0" marL="0" rtl="0" algn="l">
+              <a:spcBef>
+                <a:spcPts val="0"/>
+              </a:spcBef>
+              <a:spcAft>
+                <a:spcPts val="0"/>
+              </a:spcAft>
+              <a:buNone/>
+            </a:pPr>
+            <a:r>
+              <a:t/>
+            </a:r>
+            <a:endParaRPr/>
+          </a:p>
+        </p:txBody>
+      </p:sp>
+    </p:spTree>
+  </p:cSld>
+  <p:clrMapOvr>
+    <a:masterClrMapping/>
+  </p:clrMapOvr>
+</p:notes>
+</file>
+
+<file path=ppt/notesSlides/notesSlide7.xml><?xml version="1.0" encoding="utf-8"?>
+<p:notes xmlns:a="http://schemas.openxmlformats.org/drawingml/2006/main" xmlns:r="http://schemas.openxmlformats.org/officeDocument/2006/relationships" xmlns:mc="http://schemas.openxmlformats.org/markup-compatibility/2006" xmlns:mv="urn:schemas-microsoft-com:mac:vml" xmlns:p="http://schemas.openxmlformats.org/presentationml/2006/main" xmlns:c="http://schemas.openxmlformats.org/drawingml/2006/chart" xmlns:dgm="http://schemas.openxmlformats.org/drawingml/2006/diagram" xmlns:o="urn:schemas-microsoft-com:office:office" xmlns:v="urn:schemas-microsoft-com:vml" xmlns:pvml="urn:schemas-microsoft-com:office:powerpoint" xmlns:com="http://schemas.openxmlformats.org/drawingml/2006/compatibility" xmlns:p14="http://schemas.microsoft.com/office/powerpoint/2010/main" xmlns:p15="http://schemas.microsoft.com/office/powerpoint/2012/main" xmlns:ahyp="http://schemas.microsoft.com/office/drawing/2018/hyperlinkcolor" showMasterPhAnim="0" showMasterSp="0">
+  <p:cSld>
+    <p:spTree>
+      <p:nvGrpSpPr>
+        <p:cNvPr id="83" name="Shape 83"/>
+        <p:cNvGrpSpPr/>
+        <p:nvPr/>
+      </p:nvGrpSpPr>
+      <p:grpSpPr>
+        <a:xfrm>
+          <a:off x="0" y="0"/>
+          <a:ext cx="0" cy="0"/>
+          <a:chOff x="0" y="0"/>
+          <a:chExt cx="0" cy="0"/>
+        </a:xfrm>
+      </p:grpSpPr>
+      <p:sp>
+        <p:nvSpPr>
+          <p:cNvPr id="84" name="Google Shape;84;g18fd8a630f9_0_72:notes"/>
+          <p:cNvSpPr/>
+          <p:nvPr>
+            <p:ph idx="2" type="sldImg"/>
+          </p:nvPr>
+        </p:nvSpPr>
+        <p:spPr>
+          <a:xfrm>
+            <a:off x="381300" y="685800"/>
+            <a:ext cx="6096000" cy="3429000"/>
+          </a:xfrm>
+          <a:custGeom>
+            <a:rect b="b" l="l" r="r" t="t"/>
+            <a:pathLst>
+              <a:path extrusionOk="0" h="120000" w="120000">
+                <a:moveTo>
+                  <a:pt x="0" y="0"/>
+                </a:moveTo>
+                <a:lnTo>
+                  <a:pt x="120000" y="0"/>
+                </a:lnTo>
+                <a:lnTo>
+                  <a:pt x="120000" y="120000"/>
+                </a:lnTo>
+                <a:lnTo>
+                  <a:pt x="0" y="120000"/>
+                </a:lnTo>
+                <a:close/>
+              </a:path>
+            </a:pathLst>
+          </a:custGeom>
+        </p:spPr>
+      </p:sp>
+      <p:sp>
+        <p:nvSpPr>
+          <p:cNvPr id="85" name="Google Shape;85;g18fd8a630f9_0_72:notes"/>
+          <p:cNvSpPr txBox="1"/>
+          <p:nvPr>
+            <p:ph idx="1" type="body"/>
+          </p:nvPr>
+        </p:nvSpPr>
+        <p:spPr>
+          <a:xfrm>
+            <a:off x="685800" y="4343400"/>
+            <a:ext cx="5486400" cy="4114800"/>
+          </a:xfrm>
+          <a:prstGeom prst="rect">
+            <a:avLst/>
+          </a:prstGeom>
+        </p:spPr>
+        <p:txBody>
+          <a:bodyPr anchorCtr="0" anchor="t" bIns="91425" lIns="91425" spcFirstLastPara="1" rIns="91425" wrap="square" tIns="91425">
+            <a:noAutofit/>
+          </a:bodyPr>
+          <a:lstStyle/>
+          <a:p>
+            <a:pPr indent="0" lvl="0" marL="0" rtl="0" algn="l">
+              <a:spcBef>
+                <a:spcPts val="0"/>
+              </a:spcBef>
+              <a:spcAft>
+                <a:spcPts val="0"/>
+              </a:spcAft>
+              <a:buNone/>
+            </a:pPr>
+            <a:r>
+              <a:t/>
+            </a:r>
+            <a:endParaRPr/>
+          </a:p>
+        </p:txBody>
+      </p:sp>
+    </p:spTree>
+  </p:cSld>
+  <p:clrMapOvr>
+    <a:masterClrMapping/>
+  </p:clrMapOvr>
+</p:notes>
+</file>
+
 <file path=ppt/slideLayouts/slideLayout1.xml><?xml version="1.0" encoding="utf-8"?>
 <p:sldLayout xmlns:a="http://schemas.openxmlformats.org/drawingml/2006/main" xmlns:r="http://schemas.openxmlformats.org/officeDocument/2006/relationships" xmlns:mc="http://schemas.openxmlformats.org/markup-compatibility/2006" xmlns:mv="urn:schemas-microsoft-com:mac:vml" xmlns:p="http://schemas.openxmlformats.org/presentationml/2006/main" xmlns:c="http://schemas.openxmlformats.org/drawingml/2006/chart" xmlns:dgm="http://schemas.openxmlformats.org/drawingml/2006/diagram" xmlns:o="urn:schemas-microsoft-com:office:office" xmlns:v="urn:schemas-microsoft-com:vml" xmlns:pvml="urn:schemas-microsoft-com:office:powerpoint" xmlns:com="http://schemas.openxmlformats.org/drawingml/2006/compatibility" xmlns:p14="http://schemas.microsoft.com/office/powerpoint/2010/main" xmlns:p15="http://schemas.microsoft.com/office/powerpoint/2012/main" xmlns:ahyp="http://schemas.microsoft.com/office/drawing/2018/hyperlinkcolor" matchingName="Title slide" type="title">
   <p:cSld name="TITLE">
-    <p:bg>
-      <p:bgPr>
-        <a:solidFill>
-          <a:schemeClr val="dk1"/>
-        </a:solidFill>
-      </p:bgPr>
-    </p:bg>
     <p:spTree>
       <p:nvGrpSpPr>
         <p:cNvPr id="9" name="Shape 9"/>
@@ -818,35 +1411,9 @@
           <a:chExt cx="0" cy="0"/>
         </a:xfrm>
       </p:grpSpPr>
-      <p:cxnSp>
-        <p:nvCxnSpPr>
-          <p:cNvPr id="10" name="Google Shape;10;p2"/>
-          <p:cNvCxnSpPr/>
-          <p:nvPr/>
-        </p:nvCxnSpPr>
-        <p:spPr>
-          <a:xfrm>
-            <a:off x="0" y="2998150"/>
-            <a:ext cx="9144000" cy="0"/>
-          </a:xfrm>
-          <a:prstGeom prst="straightConnector1">
-            <a:avLst/>
-          </a:prstGeom>
-          <a:noFill/>
-          <a:ln cap="flat" cmpd="sng" w="19050">
-            <a:solidFill>
-              <a:schemeClr val="lt2"/>
-            </a:solidFill>
-            <a:prstDash val="solid"/>
-            <a:round/>
-            <a:headEnd len="sm" w="sm" type="none"/>
-            <a:tailEnd len="sm" w="sm" type="none"/>
-          </a:ln>
-        </p:spPr>
-      </p:cxnSp>
       <p:sp>
         <p:nvSpPr>
-          <p:cNvPr id="11" name="Google Shape;11;p2"/>
+          <p:cNvPr id="10" name="Google Shape;10;p2"/>
           <p:cNvSpPr txBox="1"/>
           <p:nvPr>
             <p:ph type="ctrTitle"/>
@@ -854,8 +1421,8 @@
         </p:nvSpPr>
         <p:spPr>
           <a:xfrm>
-            <a:off x="510450" y="1257300"/>
-            <a:ext cx="8123100" cy="1588500"/>
+            <a:off x="311708" y="744575"/>
+            <a:ext cx="8520600" cy="2052600"/>
           </a:xfrm>
           <a:prstGeom prst="rect">
             <a:avLst/>
@@ -866,167 +1433,104 @@
             <a:normAutofit/>
           </a:bodyPr>
           <a:lstStyle>
-            <a:lvl1pPr lvl="0">
-              <a:spcBef>
-                <a:spcPts val="0"/>
-              </a:spcBef>
-              <a:spcAft>
-                <a:spcPts val="0"/>
-              </a:spcAft>
-              <a:buClr>
-                <a:schemeClr val="lt1"/>
-              </a:buClr>
-              <a:buSzPts val="4800"/>
-              <a:buNone/>
-              <a:defRPr sz="4800">
-                <a:solidFill>
-                  <a:schemeClr val="lt1"/>
-                </a:solidFill>
-              </a:defRPr>
+            <a:lvl1pPr lvl="0" algn="ctr">
+              <a:spcBef>
+                <a:spcPts val="0"/>
+              </a:spcBef>
+              <a:spcAft>
+                <a:spcPts val="0"/>
+              </a:spcAft>
+              <a:buSzPts val="5200"/>
+              <a:buNone/>
+              <a:defRPr sz="5200"/>
             </a:lvl1pPr>
-            <a:lvl2pPr lvl="1">
-              <a:spcBef>
-                <a:spcPts val="0"/>
-              </a:spcBef>
-              <a:spcAft>
-                <a:spcPts val="0"/>
-              </a:spcAft>
-              <a:buClr>
-                <a:schemeClr val="lt1"/>
-              </a:buClr>
-              <a:buSzPts val="4800"/>
-              <a:buNone/>
-              <a:defRPr sz="4800">
-                <a:solidFill>
-                  <a:schemeClr val="lt1"/>
-                </a:solidFill>
-              </a:defRPr>
+            <a:lvl2pPr lvl="1" algn="ctr">
+              <a:spcBef>
+                <a:spcPts val="0"/>
+              </a:spcBef>
+              <a:spcAft>
+                <a:spcPts val="0"/>
+              </a:spcAft>
+              <a:buSzPts val="5200"/>
+              <a:buNone/>
+              <a:defRPr sz="5200"/>
             </a:lvl2pPr>
-            <a:lvl3pPr lvl="2">
-              <a:spcBef>
-                <a:spcPts val="0"/>
-              </a:spcBef>
-              <a:spcAft>
-                <a:spcPts val="0"/>
-              </a:spcAft>
-              <a:buClr>
-                <a:schemeClr val="lt1"/>
-              </a:buClr>
-              <a:buSzPts val="4800"/>
-              <a:buNone/>
-              <a:defRPr sz="4800">
-                <a:solidFill>
-                  <a:schemeClr val="lt1"/>
-                </a:solidFill>
-              </a:defRPr>
+            <a:lvl3pPr lvl="2" algn="ctr">
+              <a:spcBef>
+                <a:spcPts val="0"/>
+              </a:spcBef>
+              <a:spcAft>
+                <a:spcPts val="0"/>
+              </a:spcAft>
+              <a:buSzPts val="5200"/>
+              <a:buNone/>
+              <a:defRPr sz="5200"/>
             </a:lvl3pPr>
-            <a:lvl4pPr lvl="3">
-              <a:spcBef>
-                <a:spcPts val="0"/>
-              </a:spcBef>
-              <a:spcAft>
-                <a:spcPts val="0"/>
-              </a:spcAft>
-              <a:buClr>
-                <a:schemeClr val="lt1"/>
-              </a:buClr>
-              <a:buSzPts val="4800"/>
-              <a:buNone/>
-              <a:defRPr sz="4800">
-                <a:solidFill>
-                  <a:schemeClr val="lt1"/>
-                </a:solidFill>
-              </a:defRPr>
+            <a:lvl4pPr lvl="3" algn="ctr">
+              <a:spcBef>
+                <a:spcPts val="0"/>
+              </a:spcBef>
+              <a:spcAft>
+                <a:spcPts val="0"/>
+              </a:spcAft>
+              <a:buSzPts val="5200"/>
+              <a:buNone/>
+              <a:defRPr sz="5200"/>
             </a:lvl4pPr>
-            <a:lvl5pPr lvl="4">
-              <a:spcBef>
-                <a:spcPts val="0"/>
-              </a:spcBef>
-              <a:spcAft>
-                <a:spcPts val="0"/>
-              </a:spcAft>
-              <a:buClr>
-                <a:schemeClr val="lt1"/>
-              </a:buClr>
-              <a:buSzPts val="4800"/>
-              <a:buNone/>
-              <a:defRPr sz="4800">
-                <a:solidFill>
-                  <a:schemeClr val="lt1"/>
-                </a:solidFill>
-              </a:defRPr>
+            <a:lvl5pPr lvl="4" algn="ctr">
+              <a:spcBef>
+                <a:spcPts val="0"/>
+              </a:spcBef>
+              <a:spcAft>
+                <a:spcPts val="0"/>
+              </a:spcAft>
+              <a:buSzPts val="5200"/>
+              <a:buNone/>
+              <a:defRPr sz="5200"/>
             </a:lvl5pPr>
-            <a:lvl6pPr lvl="5">
-              <a:spcBef>
-                <a:spcPts val="0"/>
-              </a:spcBef>
-              <a:spcAft>
-                <a:spcPts val="0"/>
-              </a:spcAft>
-              <a:buClr>
-                <a:schemeClr val="lt1"/>
-              </a:buClr>
-              <a:buSzPts val="4800"/>
-              <a:buNone/>
-              <a:defRPr sz="4800">
-                <a:solidFill>
-                  <a:schemeClr val="lt1"/>
-                </a:solidFill>
-              </a:defRPr>
+            <a:lvl6pPr lvl="5" algn="ctr">
+              <a:spcBef>
+                <a:spcPts val="0"/>
+              </a:spcBef>
+              <a:spcAft>
+                <a:spcPts val="0"/>
+              </a:spcAft>
+              <a:buSzPts val="5200"/>
+              <a:buNone/>
+              <a:defRPr sz="5200"/>
             </a:lvl6pPr>
-            <a:lvl7pPr lvl="6">
-              <a:spcBef>
-                <a:spcPts val="0"/>
-              </a:spcBef>
-              <a:spcAft>
-                <a:spcPts val="0"/>
-              </a:spcAft>
-              <a:buClr>
-                <a:schemeClr val="lt1"/>
-              </a:buClr>
-              <a:buSzPts val="4800"/>
-              <a:buNone/>
-              <a:defRPr sz="4800">
-                <a:solidFill>
-                  <a:schemeClr val="lt1"/>
-                </a:solidFill>
-              </a:defRPr>
+            <a:lvl7pPr lvl="6" algn="ctr">
+              <a:spcBef>
+                <a:spcPts val="0"/>
+              </a:spcBef>
+              <a:spcAft>
+                <a:spcPts val="0"/>
+              </a:spcAft>
+              <a:buSzPts val="5200"/>
+              <a:buNone/>
+              <a:defRPr sz="5200"/>
             </a:lvl7pPr>
-            <a:lvl8pPr lvl="7">
-              <a:spcBef>
-                <a:spcPts val="0"/>
-              </a:spcBef>
-              <a:spcAft>
-                <a:spcPts val="0"/>
-              </a:spcAft>
-              <a:buClr>
-                <a:schemeClr val="lt1"/>
-              </a:buClr>
-              <a:buSzPts val="4800"/>
-              <a:buNone/>
-              <a:defRPr sz="4800">
-                <a:solidFill>
-                  <a:schemeClr val="lt1"/>
-                </a:solidFill>
-              </a:defRPr>
+            <a:lvl8pPr lvl="7" algn="ctr">
+              <a:spcBef>
+                <a:spcPts val="0"/>
+              </a:spcBef>
+              <a:spcAft>
+                <a:spcPts val="0"/>
+              </a:spcAft>
+              <a:buSzPts val="5200"/>
+              <a:buNone/>
+              <a:defRPr sz="5200"/>
             </a:lvl8pPr>
-            <a:lvl9pPr lvl="8">
-              <a:spcBef>
-                <a:spcPts val="0"/>
-              </a:spcBef>
-              <a:spcAft>
-                <a:spcPts val="0"/>
-              </a:spcAft>
-              <a:buClr>
-                <a:schemeClr val="lt1"/>
-              </a:buClr>
-              <a:buSzPts val="4800"/>
-              <a:buNone/>
-              <a:defRPr sz="4800">
-                <a:solidFill>
-                  <a:schemeClr val="lt1"/>
-                </a:solidFill>
-              </a:defRPr>
+            <a:lvl9pPr lvl="8" algn="ctr">
+              <a:spcBef>
+                <a:spcPts val="0"/>
+              </a:spcBef>
+              <a:spcAft>
+                <a:spcPts val="0"/>
+              </a:spcAft>
+              <a:buSzPts val="5200"/>
+              <a:buNone/>
+              <a:defRPr sz="5200"/>
             </a:lvl9pPr>
           </a:lstStyle>
           <a:p/>
@@ -1034,7 +1538,7 @@
       </p:sp>
       <p:sp>
         <p:nvSpPr>
-          <p:cNvPr id="12" name="Google Shape;12;p2"/>
+          <p:cNvPr id="11" name="Google Shape;11;p2"/>
           <p:cNvSpPr txBox="1"/>
           <p:nvPr>
             <p:ph idx="1" type="subTitle"/>
@@ -1042,8 +1546,8 @@
         </p:nvSpPr>
         <p:spPr>
           <a:xfrm>
-            <a:off x="510450" y="3182313"/>
-            <a:ext cx="8123100" cy="630000"/>
+            <a:off x="311700" y="2834125"/>
+            <a:ext cx="8520600" cy="792600"/>
           </a:xfrm>
           <a:prstGeom prst="rect">
             <a:avLst/>
@@ -1054,7 +1558,7 @@
             <a:normAutofit/>
           </a:bodyPr>
           <a:lstStyle>
-            <a:lvl1pPr lvl="0">
+            <a:lvl1pPr lvl="0" algn="ctr">
               <a:lnSpc>
                 <a:spcPct val="100000"/>
               </a:lnSpc>
@@ -1064,18 +1568,11 @@
               <a:spcAft>
                 <a:spcPts val="0"/>
               </a:spcAft>
-              <a:buClr>
-                <a:schemeClr val="lt1"/>
-              </a:buClr>
-              <a:buSzPts val="2400"/>
-              <a:buNone/>
-              <a:defRPr sz="2400">
-                <a:solidFill>
-                  <a:schemeClr val="lt1"/>
-                </a:solidFill>
-              </a:defRPr>
+              <a:buSzPts val="2800"/>
+              <a:buNone/>
+              <a:defRPr sz="2800"/>
             </a:lvl1pPr>
-            <a:lvl2pPr lvl="1">
+            <a:lvl2pPr lvl="1" algn="ctr">
               <a:lnSpc>
                 <a:spcPct val="100000"/>
               </a:lnSpc>
@@ -1085,18 +1582,11 @@
               <a:spcAft>
                 <a:spcPts val="0"/>
               </a:spcAft>
-              <a:buClr>
-                <a:schemeClr val="lt1"/>
-              </a:buClr>
-              <a:buSzPts val="2400"/>
-              <a:buNone/>
-              <a:defRPr sz="2400">
-                <a:solidFill>
-                  <a:schemeClr val="lt1"/>
-                </a:solidFill>
-              </a:defRPr>
+              <a:buSzPts val="2800"/>
+              <a:buNone/>
+              <a:defRPr sz="2800"/>
             </a:lvl2pPr>
-            <a:lvl3pPr lvl="2">
+            <a:lvl3pPr lvl="2" algn="ctr">
               <a:lnSpc>
                 <a:spcPct val="100000"/>
               </a:lnSpc>
@@ -1106,18 +1596,11 @@
               <a:spcAft>
                 <a:spcPts val="0"/>
               </a:spcAft>
-              <a:buClr>
-                <a:schemeClr val="lt1"/>
-              </a:buClr>
-              <a:buSzPts val="2400"/>
-              <a:buNone/>
-              <a:defRPr sz="2400">
-                <a:solidFill>
-                  <a:schemeClr val="lt1"/>
-                </a:solidFill>
-              </a:defRPr>
+              <a:buSzPts val="2800"/>
+              <a:buNone/>
+              <a:defRPr sz="2800"/>
             </a:lvl3pPr>
-            <a:lvl4pPr lvl="3">
+            <a:lvl4pPr lvl="3" algn="ctr">
               <a:lnSpc>
                 <a:spcPct val="100000"/>
               </a:lnSpc>
@@ -1127,18 +1610,11 @@
               <a:spcAft>
                 <a:spcPts val="0"/>
               </a:spcAft>
-              <a:buClr>
-                <a:schemeClr val="lt1"/>
-              </a:buClr>
-              <a:buSzPts val="2400"/>
-              <a:buNone/>
-              <a:defRPr sz="2400">
-                <a:solidFill>
-                  <a:schemeClr val="lt1"/>
-                </a:solidFill>
-              </a:defRPr>
+              <a:buSzPts val="2800"/>
+              <a:buNone/>
+              <a:defRPr sz="2800"/>
             </a:lvl4pPr>
-            <a:lvl5pPr lvl="4">
+            <a:lvl5pPr lvl="4" algn="ctr">
               <a:lnSpc>
                 <a:spcPct val="100000"/>
               </a:lnSpc>
@@ -1148,18 +1624,11 @@
               <a:spcAft>
                 <a:spcPts val="0"/>
               </a:spcAft>
-              <a:buClr>
-                <a:schemeClr val="lt1"/>
-              </a:buClr>
-              <a:buSzPts val="2400"/>
-              <a:buNone/>
-              <a:defRPr sz="2400">
-                <a:solidFill>
-                  <a:schemeClr val="lt1"/>
-                </a:solidFill>
-              </a:defRPr>
+              <a:buSzPts val="2800"/>
+              <a:buNone/>
+              <a:defRPr sz="2800"/>
             </a:lvl5pPr>
-            <a:lvl6pPr lvl="5">
+            <a:lvl6pPr lvl="5" algn="ctr">
               <a:lnSpc>
                 <a:spcPct val="100000"/>
               </a:lnSpc>
@@ -1169,18 +1638,11 @@
               <a:spcAft>
                 <a:spcPts val="0"/>
               </a:spcAft>
-              <a:buClr>
-                <a:schemeClr val="lt1"/>
-              </a:buClr>
-              <a:buSzPts val="2400"/>
-              <a:buNone/>
-              <a:defRPr sz="2400">
-                <a:solidFill>
-                  <a:schemeClr val="lt1"/>
-                </a:solidFill>
-              </a:defRPr>
+              <a:buSzPts val="2800"/>
+              <a:buNone/>
+              <a:defRPr sz="2800"/>
             </a:lvl6pPr>
-            <a:lvl7pPr lvl="6">
+            <a:lvl7pPr lvl="6" algn="ctr">
               <a:lnSpc>
                 <a:spcPct val="100000"/>
               </a:lnSpc>
@@ -1190,18 +1652,11 @@
               <a:spcAft>
                 <a:spcPts val="0"/>
               </a:spcAft>
-              <a:buClr>
-                <a:schemeClr val="lt1"/>
-              </a:buClr>
-              <a:buSzPts val="2400"/>
-              <a:buNone/>
-              <a:defRPr sz="2400">
-                <a:solidFill>
-                  <a:schemeClr val="lt1"/>
-                </a:solidFill>
-              </a:defRPr>
+              <a:buSzPts val="2800"/>
+              <a:buNone/>
+              <a:defRPr sz="2800"/>
             </a:lvl7pPr>
-            <a:lvl8pPr lvl="7">
+            <a:lvl8pPr lvl="7" algn="ctr">
               <a:lnSpc>
                 <a:spcPct val="100000"/>
               </a:lnSpc>
@@ -1211,18 +1666,11 @@
               <a:spcAft>
                 <a:spcPts val="0"/>
               </a:spcAft>
-              <a:buClr>
-                <a:schemeClr val="lt1"/>
-              </a:buClr>
-              <a:buSzPts val="2400"/>
-              <a:buNone/>
-              <a:defRPr sz="2400">
-                <a:solidFill>
-                  <a:schemeClr val="lt1"/>
-                </a:solidFill>
-              </a:defRPr>
+              <a:buSzPts val="2800"/>
+              <a:buNone/>
+              <a:defRPr sz="2800"/>
             </a:lvl8pPr>
-            <a:lvl9pPr lvl="8">
+            <a:lvl9pPr lvl="8" algn="ctr">
               <a:lnSpc>
                 <a:spcPct val="100000"/>
               </a:lnSpc>
@@ -1232,16 +1680,9 @@
               <a:spcAft>
                 <a:spcPts val="0"/>
               </a:spcAft>
-              <a:buClr>
-                <a:schemeClr val="lt1"/>
-              </a:buClr>
-              <a:buSzPts val="2400"/>
-              <a:buNone/>
-              <a:defRPr sz="2400">
-                <a:solidFill>
-                  <a:schemeClr val="lt1"/>
-                </a:solidFill>
-              </a:defRPr>
+              <a:buSzPts val="2800"/>
+              <a:buNone/>
+              <a:defRPr sz="2800"/>
             </a:lvl9pPr>
           </a:lstStyle>
           <a:p/>
@@ -1249,7 +1690,7 @@
       </p:sp>
       <p:sp>
         <p:nvSpPr>
-          <p:cNvPr id="13" name="Google Shape;13;p2"/>
+          <p:cNvPr id="12" name="Google Shape;12;p2"/>
           <p:cNvSpPr txBox="1"/>
           <p:nvPr>
             <p:ph idx="12" type="sldNum"/>
@@ -1271,75 +1712,39 @@
           <a:lstStyle>
             <a:lvl1pPr lvl="0">
               <a:buNone/>
-              <a:defRPr>
-                <a:solidFill>
-                  <a:schemeClr val="lt1"/>
-                </a:solidFill>
-              </a:defRPr>
+              <a:defRPr/>
             </a:lvl1pPr>
             <a:lvl2pPr lvl="1">
               <a:buNone/>
-              <a:defRPr>
-                <a:solidFill>
-                  <a:schemeClr val="lt1"/>
-                </a:solidFill>
-              </a:defRPr>
+              <a:defRPr/>
             </a:lvl2pPr>
             <a:lvl3pPr lvl="2">
               <a:buNone/>
-              <a:defRPr>
-                <a:solidFill>
-                  <a:schemeClr val="lt1"/>
-                </a:solidFill>
-              </a:defRPr>
+              <a:defRPr/>
             </a:lvl3pPr>
             <a:lvl4pPr lvl="3">
               <a:buNone/>
-              <a:defRPr>
-                <a:solidFill>
-                  <a:schemeClr val="lt1"/>
-                </a:solidFill>
-              </a:defRPr>
+              <a:defRPr/>
             </a:lvl4pPr>
             <a:lvl5pPr lvl="4">
               <a:buNone/>
-              <a:defRPr>
-                <a:solidFill>
-                  <a:schemeClr val="lt1"/>
-                </a:solidFill>
-              </a:defRPr>
+              <a:defRPr/>
             </a:lvl5pPr>
             <a:lvl6pPr lvl="5">
               <a:buNone/>
-              <a:defRPr>
-                <a:solidFill>
-                  <a:schemeClr val="lt1"/>
-                </a:solidFill>
-              </a:defRPr>
+              <a:defRPr/>
             </a:lvl6pPr>
             <a:lvl7pPr lvl="6">
               <a:buNone/>
-              <a:defRPr>
-                <a:solidFill>
-                  <a:schemeClr val="lt1"/>
-                </a:solidFill>
-              </a:defRPr>
+              <a:defRPr/>
             </a:lvl7pPr>
             <a:lvl8pPr lvl="7">
               <a:buNone/>
-              <a:defRPr>
-                <a:solidFill>
-                  <a:schemeClr val="lt1"/>
-                </a:solidFill>
-              </a:defRPr>
+              <a:defRPr/>
             </a:lvl8pPr>
             <a:lvl9pPr lvl="8">
               <a:buNone/>
-              <a:defRPr>
-                <a:solidFill>
-                  <a:schemeClr val="lt1"/>
-                </a:solidFill>
-              </a:defRPr>
+              <a:defRPr/>
             </a:lvl9pPr>
           </a:lstStyle>
           <a:p>
@@ -1373,7 +1778,7 @@
   <p:cSld name="BIG_NUMBER">
     <p:spTree>
       <p:nvGrpSpPr>
-        <p:cNvPr id="48" name="Shape 48"/>
+        <p:cNvPr id="44" name="Shape 44"/>
         <p:cNvGrpSpPr/>
         <p:nvPr/>
       </p:nvGrpSpPr>
@@ -1387,50 +1792,7 @@
       </p:grpSpPr>
       <p:sp>
         <p:nvSpPr>
-          <p:cNvPr id="49" name="Google Shape;49;p11"/>
-          <p:cNvSpPr/>
-          <p:nvPr/>
-        </p:nvSpPr>
-        <p:spPr>
-          <a:xfrm>
-            <a:off x="0" y="5045700"/>
-            <a:ext cx="9144000" cy="97800"/>
-          </a:xfrm>
-          <a:prstGeom prst="rect">
-            <a:avLst/>
-          </a:prstGeom>
-          <a:solidFill>
-            <a:schemeClr val="lt2"/>
-          </a:solidFill>
-          <a:ln>
-            <a:noFill/>
-          </a:ln>
-        </p:spPr>
-        <p:txBody>
-          <a:bodyPr anchorCtr="0" anchor="ctr" bIns="91425" lIns="91425" spcFirstLastPara="1" rIns="91425" wrap="square" tIns="91425">
-            <a:noAutofit/>
-          </a:bodyPr>
-          <a:lstStyle/>
-          <a:p>
-            <a:pPr indent="0" lvl="0" marL="0" rtl="0" algn="l">
-              <a:spcBef>
-                <a:spcPts val="0"/>
-              </a:spcBef>
-              <a:spcAft>
-                <a:spcPts val="0"/>
-              </a:spcAft>
-              <a:buNone/>
-            </a:pPr>
-            <a:r>
-              <a:t/>
-            </a:r>
-            <a:endParaRPr/>
-          </a:p>
-        </p:txBody>
-      </p:sp>
-      <p:sp>
-        <p:nvSpPr>
-          <p:cNvPr id="50" name="Google Shape;50;p11"/>
+          <p:cNvPr id="45" name="Google Shape;45;p11"/>
           <p:cNvSpPr txBox="1"/>
           <p:nvPr>
             <p:ph hasCustomPrompt="1" type="title"/>
@@ -1438,15 +1800,15 @@
         </p:nvSpPr>
         <p:spPr>
           <a:xfrm>
-            <a:off x="311700" y="991475"/>
-            <a:ext cx="8520600" cy="1917900"/>
+            <a:off x="311700" y="1106125"/>
+            <a:ext cx="8520600" cy="1963500"/>
           </a:xfrm>
           <a:prstGeom prst="rect">
             <a:avLst/>
           </a:prstGeom>
         </p:spPr>
         <p:txBody>
-          <a:bodyPr anchorCtr="0" anchor="ctr" bIns="91425" lIns="91425" spcFirstLastPara="1" rIns="91425" wrap="square" tIns="91425">
+          <a:bodyPr anchorCtr="0" anchor="b" bIns="91425" lIns="91425" spcFirstLastPara="1" rIns="91425" wrap="square" tIns="91425">
             <a:normAutofit/>
           </a:bodyPr>
           <a:lstStyle>
@@ -1457,9 +1819,9 @@
               <a:spcAft>
                 <a:spcPts val="0"/>
               </a:spcAft>
-              <a:buSzPts val="14000"/>
-              <a:buNone/>
-              <a:defRPr b="1" sz="14000"/>
+              <a:buSzPts val="12000"/>
+              <a:buNone/>
+              <a:defRPr sz="12000"/>
             </a:lvl1pPr>
             <a:lvl2pPr lvl="1" algn="ctr">
               <a:spcBef>
@@ -1468,9 +1830,9 @@
               <a:spcAft>
                 <a:spcPts val="0"/>
               </a:spcAft>
-              <a:buSzPts val="14000"/>
-              <a:buNone/>
-              <a:defRPr b="1" sz="14000"/>
+              <a:buSzPts val="12000"/>
+              <a:buNone/>
+              <a:defRPr sz="12000"/>
             </a:lvl2pPr>
             <a:lvl3pPr lvl="2" algn="ctr">
               <a:spcBef>
@@ -1479,9 +1841,9 @@
               <a:spcAft>
                 <a:spcPts val="0"/>
               </a:spcAft>
-              <a:buSzPts val="14000"/>
-              <a:buNone/>
-              <a:defRPr b="1" sz="14000"/>
+              <a:buSzPts val="12000"/>
+              <a:buNone/>
+              <a:defRPr sz="12000"/>
             </a:lvl3pPr>
             <a:lvl4pPr lvl="3" algn="ctr">
               <a:spcBef>
@@ -1490,9 +1852,9 @@
               <a:spcAft>
                 <a:spcPts val="0"/>
               </a:spcAft>
-              <a:buSzPts val="14000"/>
-              <a:buNone/>
-              <a:defRPr b="1" sz="14000"/>
+              <a:buSzPts val="12000"/>
+              <a:buNone/>
+              <a:defRPr sz="12000"/>
             </a:lvl4pPr>
             <a:lvl5pPr lvl="4" algn="ctr">
               <a:spcBef>
@@ -1501,9 +1863,9 @@
               <a:spcAft>
                 <a:spcPts val="0"/>
               </a:spcAft>
-              <a:buSzPts val="14000"/>
-              <a:buNone/>
-              <a:defRPr b="1" sz="14000"/>
+              <a:buSzPts val="12000"/>
+              <a:buNone/>
+              <a:defRPr sz="12000"/>
             </a:lvl5pPr>
             <a:lvl6pPr lvl="5" algn="ctr">
               <a:spcBef>
@@ -1512,9 +1874,9 @@
               <a:spcAft>
                 <a:spcPts val="0"/>
               </a:spcAft>
-              <a:buSzPts val="14000"/>
-              <a:buNone/>
-              <a:defRPr b="1" sz="14000"/>
+              <a:buSzPts val="12000"/>
+              <a:buNone/>
+              <a:defRPr sz="12000"/>
             </a:lvl6pPr>
             <a:lvl7pPr lvl="6" algn="ctr">
               <a:spcBef>
@@ -1523,9 +1885,9 @@
               <a:spcAft>
                 <a:spcPts val="0"/>
               </a:spcAft>
-              <a:buSzPts val="14000"/>
-              <a:buNone/>
-              <a:defRPr b="1" sz="14000"/>
+              <a:buSzPts val="12000"/>
+              <a:buNone/>
+              <a:defRPr sz="12000"/>
             </a:lvl7pPr>
             <a:lvl8pPr lvl="7" algn="ctr">
               <a:spcBef>
@@ -1534,9 +1896,9 @@
               <a:spcAft>
                 <a:spcPts val="0"/>
               </a:spcAft>
-              <a:buSzPts val="14000"/>
-              <a:buNone/>
-              <a:defRPr b="1" sz="14000"/>
+              <a:buSzPts val="12000"/>
+              <a:buNone/>
+              <a:defRPr sz="12000"/>
             </a:lvl8pPr>
             <a:lvl9pPr lvl="8" algn="ctr">
               <a:spcBef>
@@ -1545,9 +1907,9 @@
               <a:spcAft>
                 <a:spcPts val="0"/>
               </a:spcAft>
-              <a:buSzPts val="14000"/>
-              <a:buNone/>
-              <a:defRPr b="1" sz="14000"/>
+              <a:buSzPts val="12000"/>
+              <a:buNone/>
+              <a:defRPr sz="12000"/>
             </a:lvl9pPr>
           </a:lstStyle>
           <a:p>
@@ -1559,7 +1921,7 @@
       </p:sp>
       <p:sp>
         <p:nvSpPr>
-          <p:cNvPr id="51" name="Google Shape;51;p11"/>
+          <p:cNvPr id="46" name="Google Shape;46;p11"/>
           <p:cNvSpPr txBox="1"/>
           <p:nvPr>
             <p:ph idx="1" type="body"/>
@@ -1567,8 +1929,8 @@
         </p:nvSpPr>
         <p:spPr>
           <a:xfrm>
-            <a:off x="311700" y="3071300"/>
-            <a:ext cx="8520600" cy="901800"/>
+            <a:off x="311700" y="3152225"/>
+            <a:ext cx="8520600" cy="1300800"/>
           </a:xfrm>
           <a:prstGeom prst="rect">
             <a:avLst/>
@@ -1684,7 +2046,7 @@
       </p:sp>
       <p:sp>
         <p:nvSpPr>
-          <p:cNvPr id="52" name="Google Shape;52;p11"/>
+          <p:cNvPr id="47" name="Google Shape;47;p11"/>
           <p:cNvSpPr txBox="1"/>
           <p:nvPr>
             <p:ph idx="12" type="sldNum"/>
@@ -1772,7 +2134,7 @@
   <p:cSld name="BLANK">
     <p:spTree>
       <p:nvGrpSpPr>
-        <p:cNvPr id="53" name="Shape 53"/>
+        <p:cNvPr id="48" name="Shape 48"/>
         <p:cNvGrpSpPr/>
         <p:nvPr/>
       </p:nvGrpSpPr>
@@ -1786,7 +2148,7 @@
       </p:grpSpPr>
       <p:sp>
         <p:nvSpPr>
-          <p:cNvPr id="54" name="Google Shape;54;p12"/>
+          <p:cNvPr id="49" name="Google Shape;49;p12"/>
           <p:cNvSpPr txBox="1"/>
           <p:nvPr>
             <p:ph idx="12" type="sldNum"/>
@@ -1872,16 +2234,9 @@
 <file path=ppt/slideLayouts/slideLayout2.xml><?xml version="1.0" encoding="utf-8"?>
 <p:sldLayout xmlns:a="http://schemas.openxmlformats.org/drawingml/2006/main" xmlns:r="http://schemas.openxmlformats.org/officeDocument/2006/relationships" xmlns:mc="http://schemas.openxmlformats.org/markup-compatibility/2006" xmlns:mv="urn:schemas-microsoft-com:mac:vml" xmlns:p="http://schemas.openxmlformats.org/presentationml/2006/main" xmlns:c="http://schemas.openxmlformats.org/drawingml/2006/chart" xmlns:dgm="http://schemas.openxmlformats.org/drawingml/2006/diagram" xmlns:o="urn:schemas-microsoft-com:office:office" xmlns:v="urn:schemas-microsoft-com:vml" xmlns:pvml="urn:schemas-microsoft-com:office:powerpoint" xmlns:com="http://schemas.openxmlformats.org/drawingml/2006/compatibility" xmlns:p14="http://schemas.microsoft.com/office/powerpoint/2010/main" xmlns:p15="http://schemas.microsoft.com/office/powerpoint/2012/main" xmlns:ahyp="http://schemas.microsoft.com/office/drawing/2018/hyperlinkcolor" matchingName="Section header" type="secHead">
   <p:cSld name="SECTION_HEADER">
-    <p:bg>
-      <p:bgPr>
-        <a:solidFill>
-          <a:schemeClr val="dk1"/>
-        </a:solidFill>
-      </p:bgPr>
-    </p:bg>
     <p:spTree>
       <p:nvGrpSpPr>
-        <p:cNvPr id="14" name="Shape 14"/>
+        <p:cNvPr id="13" name="Shape 13"/>
         <p:cNvGrpSpPr/>
         <p:nvPr/>
       </p:nvGrpSpPr>
@@ -1893,35 +2248,9 @@
           <a:chExt cx="0" cy="0"/>
         </a:xfrm>
       </p:grpSpPr>
-      <p:cxnSp>
-        <p:nvCxnSpPr>
-          <p:cNvPr id="15" name="Google Shape;15;p3"/>
-          <p:cNvCxnSpPr/>
-          <p:nvPr/>
-        </p:nvCxnSpPr>
-        <p:spPr>
-          <a:xfrm>
-            <a:off x="0" y="2998150"/>
-            <a:ext cx="9144000" cy="0"/>
-          </a:xfrm>
-          <a:prstGeom prst="straightConnector1">
-            <a:avLst/>
-          </a:prstGeom>
-          <a:noFill/>
-          <a:ln cap="flat" cmpd="sng" w="19050">
-            <a:solidFill>
-              <a:schemeClr val="lt2"/>
-            </a:solidFill>
-            <a:prstDash val="solid"/>
-            <a:round/>
-            <a:headEnd len="sm" w="sm" type="none"/>
-            <a:tailEnd len="sm" w="sm" type="none"/>
-          </a:ln>
-        </p:spPr>
-      </p:cxnSp>
       <p:sp>
         <p:nvSpPr>
-          <p:cNvPr id="16" name="Google Shape;16;p3"/>
+          <p:cNvPr id="14" name="Google Shape;14;p3"/>
           <p:cNvSpPr txBox="1"/>
           <p:nvPr>
             <p:ph type="title"/>
@@ -1929,179 +2258,116 @@
         </p:nvSpPr>
         <p:spPr>
           <a:xfrm>
-            <a:off x="510450" y="2057400"/>
-            <a:ext cx="8123100" cy="778800"/>
+            <a:off x="311700" y="2150850"/>
+            <a:ext cx="8520600" cy="841800"/>
           </a:xfrm>
           <a:prstGeom prst="rect">
             <a:avLst/>
           </a:prstGeom>
         </p:spPr>
         <p:txBody>
-          <a:bodyPr anchorCtr="0" anchor="b" bIns="91425" lIns="91425" spcFirstLastPara="1" rIns="91425" wrap="square" tIns="91425">
+          <a:bodyPr anchorCtr="0" anchor="ctr" bIns="91425" lIns="91425" spcFirstLastPara="1" rIns="91425" wrap="square" tIns="91425">
             <a:normAutofit/>
           </a:bodyPr>
           <a:lstStyle>
-            <a:lvl1pPr lvl="0">
-              <a:spcBef>
-                <a:spcPts val="0"/>
-              </a:spcBef>
-              <a:spcAft>
-                <a:spcPts val="0"/>
-              </a:spcAft>
-              <a:buClr>
-                <a:schemeClr val="lt1"/>
-              </a:buClr>
+            <a:lvl1pPr lvl="0" algn="ctr">
+              <a:spcBef>
+                <a:spcPts val="0"/>
+              </a:spcBef>
+              <a:spcAft>
+                <a:spcPts val="0"/>
+              </a:spcAft>
               <a:buSzPts val="3600"/>
               <a:buNone/>
-              <a:defRPr sz="3600">
-                <a:solidFill>
-                  <a:schemeClr val="lt1"/>
-                </a:solidFill>
-              </a:defRPr>
+              <a:defRPr sz="3600"/>
             </a:lvl1pPr>
-            <a:lvl2pPr lvl="1">
-              <a:spcBef>
-                <a:spcPts val="0"/>
-              </a:spcBef>
-              <a:spcAft>
-                <a:spcPts val="0"/>
-              </a:spcAft>
-              <a:buClr>
-                <a:schemeClr val="lt1"/>
-              </a:buClr>
+            <a:lvl2pPr lvl="1" algn="ctr">
+              <a:spcBef>
+                <a:spcPts val="0"/>
+              </a:spcBef>
+              <a:spcAft>
+                <a:spcPts val="0"/>
+              </a:spcAft>
               <a:buSzPts val="3600"/>
               <a:buNone/>
-              <a:defRPr sz="3600">
-                <a:solidFill>
-                  <a:schemeClr val="lt1"/>
-                </a:solidFill>
-              </a:defRPr>
+              <a:defRPr sz="3600"/>
             </a:lvl2pPr>
-            <a:lvl3pPr lvl="2">
-              <a:spcBef>
-                <a:spcPts val="0"/>
-              </a:spcBef>
-              <a:spcAft>
-                <a:spcPts val="0"/>
-              </a:spcAft>
-              <a:buClr>
-                <a:schemeClr val="lt1"/>
-              </a:buClr>
+            <a:lvl3pPr lvl="2" algn="ctr">
+              <a:spcBef>
+                <a:spcPts val="0"/>
+              </a:spcBef>
+              <a:spcAft>
+                <a:spcPts val="0"/>
+              </a:spcAft>
               <a:buSzPts val="3600"/>
               <a:buNone/>
-              <a:defRPr sz="3600">
-                <a:solidFill>
-                  <a:schemeClr val="lt1"/>
-                </a:solidFill>
-              </a:defRPr>
+              <a:defRPr sz="3600"/>
             </a:lvl3pPr>
-            <a:lvl4pPr lvl="3">
-              <a:spcBef>
-                <a:spcPts val="0"/>
-              </a:spcBef>
-              <a:spcAft>
-                <a:spcPts val="0"/>
-              </a:spcAft>
-              <a:buClr>
-                <a:schemeClr val="lt1"/>
-              </a:buClr>
+            <a:lvl4pPr lvl="3" algn="ctr">
+              <a:spcBef>
+                <a:spcPts val="0"/>
+              </a:spcBef>
+              <a:spcAft>
+                <a:spcPts val="0"/>
+              </a:spcAft>
               <a:buSzPts val="3600"/>
               <a:buNone/>
-              <a:defRPr sz="3600">
-                <a:solidFill>
-                  <a:schemeClr val="lt1"/>
-                </a:solidFill>
-              </a:defRPr>
+              <a:defRPr sz="3600"/>
             </a:lvl4pPr>
-            <a:lvl5pPr lvl="4">
-              <a:spcBef>
-                <a:spcPts val="0"/>
-              </a:spcBef>
-              <a:spcAft>
-                <a:spcPts val="0"/>
-              </a:spcAft>
-              <a:buClr>
-                <a:schemeClr val="lt1"/>
-              </a:buClr>
+            <a:lvl5pPr lvl="4" algn="ctr">
+              <a:spcBef>
+                <a:spcPts val="0"/>
+              </a:spcBef>
+              <a:spcAft>
+                <a:spcPts val="0"/>
+              </a:spcAft>
               <a:buSzPts val="3600"/>
               <a:buNone/>
-              <a:defRPr sz="3600">
-                <a:solidFill>
-                  <a:schemeClr val="lt1"/>
-                </a:solidFill>
-              </a:defRPr>
+              <a:defRPr sz="3600"/>
             </a:lvl5pPr>
-            <a:lvl6pPr lvl="5">
-              <a:spcBef>
-                <a:spcPts val="0"/>
-              </a:spcBef>
-              <a:spcAft>
-                <a:spcPts val="0"/>
-              </a:spcAft>
-              <a:buClr>
-                <a:schemeClr val="lt1"/>
-              </a:buClr>
+            <a:lvl6pPr lvl="5" algn="ctr">
+              <a:spcBef>
+                <a:spcPts val="0"/>
+              </a:spcBef>
+              <a:spcAft>
+                <a:spcPts val="0"/>
+              </a:spcAft>
               <a:buSzPts val="3600"/>
               <a:buNone/>
-              <a:defRPr sz="3600">
-                <a:solidFill>
-                  <a:schemeClr val="lt1"/>
-                </a:solidFill>
-              </a:defRPr>
+              <a:defRPr sz="3600"/>
             </a:lvl6pPr>
-            <a:lvl7pPr lvl="6">
-              <a:spcBef>
-                <a:spcPts val="0"/>
-              </a:spcBef>
-              <a:spcAft>
-                <a:spcPts val="0"/>
-              </a:spcAft>
-              <a:buClr>
-                <a:schemeClr val="lt1"/>
-              </a:buClr>
+            <a:lvl7pPr lvl="6" algn="ctr">
+              <a:spcBef>
+                <a:spcPts val="0"/>
+              </a:spcBef>
+              <a:spcAft>
+                <a:spcPts val="0"/>
+              </a:spcAft>
               <a:buSzPts val="3600"/>
               <a:buNone/>
-              <a:defRPr sz="3600">
-                <a:solidFill>
-                  <a:schemeClr val="lt1"/>
-                </a:solidFill>
-              </a:defRPr>
+              <a:defRPr sz="3600"/>
             </a:lvl7pPr>
-            <a:lvl8pPr lvl="7">
-              <a:spcBef>
-                <a:spcPts val="0"/>
-              </a:spcBef>
-              <a:spcAft>
-                <a:spcPts val="0"/>
-              </a:spcAft>
-              <a:buClr>
-                <a:schemeClr val="lt1"/>
-              </a:buClr>
+            <a:lvl8pPr lvl="7" algn="ctr">
+              <a:spcBef>
+                <a:spcPts val="0"/>
+              </a:spcBef>
+              <a:spcAft>
+                <a:spcPts val="0"/>
+              </a:spcAft>
               <a:buSzPts val="3600"/>
               <a:buNone/>
-              <a:defRPr sz="3600">
-                <a:solidFill>
-                  <a:schemeClr val="lt1"/>
-                </a:solidFill>
-              </a:defRPr>
+              <a:defRPr sz="3600"/>
             </a:lvl8pPr>
-            <a:lvl9pPr lvl="8">
-              <a:spcBef>
-                <a:spcPts val="0"/>
-              </a:spcBef>
-              <a:spcAft>
-                <a:spcPts val="0"/>
-              </a:spcAft>
-              <a:buClr>
-                <a:schemeClr val="lt1"/>
-              </a:buClr>
+            <a:lvl9pPr lvl="8" algn="ctr">
+              <a:spcBef>
+                <a:spcPts val="0"/>
+              </a:spcBef>
+              <a:spcAft>
+                <a:spcPts val="0"/>
+              </a:spcAft>
               <a:buSzPts val="3600"/>
               <a:buNone/>
-              <a:defRPr sz="3600">
-                <a:solidFill>
-                  <a:schemeClr val="lt1"/>
-                </a:solidFill>
-              </a:defRPr>
+              <a:defRPr sz="3600"/>
             </a:lvl9pPr>
           </a:lstStyle>
           <a:p/>
@@ -2109,7 +2375,7 @@
       </p:sp>
       <p:sp>
         <p:nvSpPr>
-          <p:cNvPr id="17" name="Google Shape;17;p3"/>
+          <p:cNvPr id="15" name="Google Shape;15;p3"/>
           <p:cNvSpPr txBox="1"/>
           <p:nvPr>
             <p:ph idx="12" type="sldNum"/>
@@ -2131,75 +2397,39 @@
           <a:lstStyle>
             <a:lvl1pPr lvl="0">
               <a:buNone/>
-              <a:defRPr>
-                <a:solidFill>
-                  <a:schemeClr val="lt1"/>
-                </a:solidFill>
-              </a:defRPr>
+              <a:defRPr/>
             </a:lvl1pPr>
             <a:lvl2pPr lvl="1">
               <a:buNone/>
-              <a:defRPr>
-                <a:solidFill>
-                  <a:schemeClr val="lt1"/>
-                </a:solidFill>
-              </a:defRPr>
+              <a:defRPr/>
             </a:lvl2pPr>
             <a:lvl3pPr lvl="2">
               <a:buNone/>
-              <a:defRPr>
-                <a:solidFill>
-                  <a:schemeClr val="lt1"/>
-                </a:solidFill>
-              </a:defRPr>
+              <a:defRPr/>
             </a:lvl3pPr>
             <a:lvl4pPr lvl="3">
               <a:buNone/>
-              <a:defRPr>
-                <a:solidFill>
-                  <a:schemeClr val="lt1"/>
-                </a:solidFill>
-              </a:defRPr>
+              <a:defRPr/>
             </a:lvl4pPr>
             <a:lvl5pPr lvl="4">
               <a:buNone/>
-              <a:defRPr>
-                <a:solidFill>
-                  <a:schemeClr val="lt1"/>
-                </a:solidFill>
-              </a:defRPr>
+              <a:defRPr/>
             </a:lvl5pPr>
             <a:lvl6pPr lvl="5">
               <a:buNone/>
-              <a:defRPr>
-                <a:solidFill>
-                  <a:schemeClr val="lt1"/>
-                </a:solidFill>
-              </a:defRPr>
+              <a:defRPr/>
             </a:lvl6pPr>
             <a:lvl7pPr lvl="6">
               <a:buNone/>
-              <a:defRPr>
-                <a:solidFill>
-                  <a:schemeClr val="lt1"/>
-                </a:solidFill>
-              </a:defRPr>
+              <a:defRPr/>
             </a:lvl7pPr>
             <a:lvl8pPr lvl="7">
               <a:buNone/>
-              <a:defRPr>
-                <a:solidFill>
-                  <a:schemeClr val="lt1"/>
-                </a:solidFill>
-              </a:defRPr>
+              <a:defRPr/>
             </a:lvl8pPr>
             <a:lvl9pPr lvl="8">
               <a:buNone/>
-              <a:defRPr>
-                <a:solidFill>
-                  <a:schemeClr val="lt1"/>
-                </a:solidFill>
-              </a:defRPr>
+              <a:defRPr/>
             </a:lvl9pPr>
           </a:lstStyle>
           <a:p>
@@ -2233,7 +2463,7 @@
   <p:cSld name="TITLE_AND_BODY">
     <p:spTree>
       <p:nvGrpSpPr>
-        <p:cNvPr id="18" name="Shape 18"/>
+        <p:cNvPr id="16" name="Shape 16"/>
         <p:cNvGrpSpPr/>
         <p:nvPr/>
       </p:nvGrpSpPr>
@@ -2247,50 +2477,7 @@
       </p:grpSpPr>
       <p:sp>
         <p:nvSpPr>
-          <p:cNvPr id="19" name="Google Shape;19;p4"/>
-          <p:cNvSpPr/>
-          <p:nvPr/>
-        </p:nvSpPr>
-        <p:spPr>
-          <a:xfrm>
-            <a:off x="0" y="5045700"/>
-            <a:ext cx="9144000" cy="97800"/>
-          </a:xfrm>
-          <a:prstGeom prst="rect">
-            <a:avLst/>
-          </a:prstGeom>
-          <a:solidFill>
-            <a:schemeClr val="lt2"/>
-          </a:solidFill>
-          <a:ln>
-            <a:noFill/>
-          </a:ln>
-        </p:spPr>
-        <p:txBody>
-          <a:bodyPr anchorCtr="0" anchor="ctr" bIns="91425" lIns="91425" spcFirstLastPara="1" rIns="91425" wrap="square" tIns="91425">
-            <a:noAutofit/>
-          </a:bodyPr>
-          <a:lstStyle/>
-          <a:p>
-            <a:pPr indent="0" lvl="0" marL="0" rtl="0" algn="l">
-              <a:spcBef>
-                <a:spcPts val="0"/>
-              </a:spcBef>
-              <a:spcAft>
-                <a:spcPts val="0"/>
-              </a:spcAft>
-              <a:buNone/>
-            </a:pPr>
-            <a:r>
-              <a:t/>
-            </a:r>
-            <a:endParaRPr/>
-          </a:p>
-        </p:txBody>
-      </p:sp>
-      <p:sp>
-        <p:nvSpPr>
-          <p:cNvPr id="20" name="Google Shape;20;p4"/>
+          <p:cNvPr id="17" name="Google Shape;17;p4"/>
           <p:cNvSpPr txBox="1"/>
           <p:nvPr>
             <p:ph type="title"/>
@@ -2415,7 +2602,7 @@
       </p:sp>
       <p:sp>
         <p:nvSpPr>
-          <p:cNvPr id="21" name="Google Shape;21;p4"/>
+          <p:cNvPr id="18" name="Google Shape;18;p4"/>
           <p:cNvSpPr txBox="1"/>
           <p:nvPr>
             <p:ph idx="1" type="body"/>
@@ -2540,7 +2727,7 @@
       </p:sp>
       <p:sp>
         <p:nvSpPr>
-          <p:cNvPr id="22" name="Google Shape;22;p4"/>
+          <p:cNvPr id="19" name="Google Shape;19;p4"/>
           <p:cNvSpPr txBox="1"/>
           <p:nvPr>
             <p:ph idx="12" type="sldNum"/>
@@ -2628,7 +2815,7 @@
   <p:cSld name="TITLE_AND_TWO_COLUMNS">
     <p:spTree>
       <p:nvGrpSpPr>
-        <p:cNvPr id="23" name="Shape 23"/>
+        <p:cNvPr id="20" name="Shape 20"/>
         <p:cNvGrpSpPr/>
         <p:nvPr/>
       </p:nvGrpSpPr>
@@ -2642,7 +2829,7 @@
       </p:grpSpPr>
       <p:sp>
         <p:nvSpPr>
-          <p:cNvPr id="24" name="Google Shape;24;p5"/>
+          <p:cNvPr id="21" name="Google Shape;21;p5"/>
           <p:cNvSpPr txBox="1"/>
           <p:nvPr>
             <p:ph type="title"/>
@@ -2767,7 +2954,7 @@
       </p:sp>
       <p:sp>
         <p:nvSpPr>
-          <p:cNvPr id="25" name="Google Shape;25;p5"/>
+          <p:cNvPr id="22" name="Google Shape;22;p5"/>
           <p:cNvSpPr txBox="1"/>
           <p:nvPr>
             <p:ph idx="1" type="body"/>
@@ -2892,7 +3079,7 @@
       </p:sp>
       <p:sp>
         <p:nvSpPr>
-          <p:cNvPr id="26" name="Google Shape;26;p5"/>
+          <p:cNvPr id="23" name="Google Shape;23;p5"/>
           <p:cNvSpPr txBox="1"/>
           <p:nvPr>
             <p:ph idx="2" type="body"/>
@@ -3017,7 +3204,7 @@
       </p:sp>
       <p:sp>
         <p:nvSpPr>
-          <p:cNvPr id="27" name="Google Shape;27;p5"/>
+          <p:cNvPr id="24" name="Google Shape;24;p5"/>
           <p:cNvSpPr txBox="1"/>
           <p:nvPr>
             <p:ph idx="12" type="sldNum"/>
@@ -3105,7 +3292,7 @@
   <p:cSld name="TITLE_ONLY">
     <p:spTree>
       <p:nvGrpSpPr>
-        <p:cNvPr id="28" name="Shape 28"/>
+        <p:cNvPr id="25" name="Shape 25"/>
         <p:cNvGrpSpPr/>
         <p:nvPr/>
       </p:nvGrpSpPr>
@@ -3119,7 +3306,7 @@
       </p:grpSpPr>
       <p:sp>
         <p:nvSpPr>
-          <p:cNvPr id="29" name="Google Shape;29;p6"/>
+          <p:cNvPr id="26" name="Google Shape;26;p6"/>
           <p:cNvSpPr txBox="1"/>
           <p:nvPr>
             <p:ph type="title"/>
@@ -3244,7 +3431,7 @@
       </p:sp>
       <p:sp>
         <p:nvSpPr>
-          <p:cNvPr id="30" name="Google Shape;30;p6"/>
+          <p:cNvPr id="27" name="Google Shape;27;p6"/>
           <p:cNvSpPr txBox="1"/>
           <p:nvPr>
             <p:ph idx="12" type="sldNum"/>
@@ -3332,7 +3519,7 @@
   <p:cSld name="ONE_COLUMN_TEXT">
     <p:spTree>
       <p:nvGrpSpPr>
-        <p:cNvPr id="31" name="Shape 31"/>
+        <p:cNvPr id="28" name="Shape 28"/>
         <p:cNvGrpSpPr/>
         <p:nvPr/>
       </p:nvGrpSpPr>
@@ -3346,7 +3533,7 @@
       </p:grpSpPr>
       <p:sp>
         <p:nvSpPr>
-          <p:cNvPr id="32" name="Google Shape;32;p7"/>
+          <p:cNvPr id="29" name="Google Shape;29;p7"/>
           <p:cNvSpPr txBox="1"/>
           <p:nvPr>
             <p:ph type="title"/>
@@ -3471,7 +3658,7 @@
       </p:sp>
       <p:sp>
         <p:nvSpPr>
-          <p:cNvPr id="33" name="Google Shape;33;p7"/>
+          <p:cNvPr id="30" name="Google Shape;30;p7"/>
           <p:cNvSpPr txBox="1"/>
           <p:nvPr>
             <p:ph idx="1" type="body"/>
@@ -3596,7 +3783,7 @@
       </p:sp>
       <p:sp>
         <p:nvSpPr>
-          <p:cNvPr id="34" name="Google Shape;34;p7"/>
+          <p:cNvPr id="31" name="Google Shape;31;p7"/>
           <p:cNvSpPr txBox="1"/>
           <p:nvPr>
             <p:ph idx="12" type="sldNum"/>
@@ -3682,16 +3869,9 @@
 <file path=ppt/slideLayouts/slideLayout7.xml><?xml version="1.0" encoding="utf-8"?>
 <p:sldLayout xmlns:a="http://schemas.openxmlformats.org/drawingml/2006/main" xmlns:r="http://schemas.openxmlformats.org/officeDocument/2006/relationships" xmlns:mc="http://schemas.openxmlformats.org/markup-compatibility/2006" xmlns:mv="urn:schemas-microsoft-com:mac:vml" xmlns:p="http://schemas.openxmlformats.org/presentationml/2006/main" xmlns:c="http://schemas.openxmlformats.org/drawingml/2006/chart" xmlns:dgm="http://schemas.openxmlformats.org/drawingml/2006/diagram" xmlns:o="urn:schemas-microsoft-com:office:office" xmlns:v="urn:schemas-microsoft-com:vml" xmlns:pvml="urn:schemas-microsoft-com:office:powerpoint" xmlns:com="http://schemas.openxmlformats.org/drawingml/2006/compatibility" xmlns:p14="http://schemas.microsoft.com/office/powerpoint/2010/main" xmlns:p15="http://schemas.microsoft.com/office/powerpoint/2012/main" xmlns:ahyp="http://schemas.microsoft.com/office/drawing/2018/hyperlinkcolor" matchingName="Main point">
   <p:cSld name="MAIN_POINT">
-    <p:bg>
-      <p:bgPr>
-        <a:solidFill>
-          <a:schemeClr val="lt2"/>
-        </a:solidFill>
-      </p:bgPr>
-    </p:bg>
     <p:spTree>
       <p:nvGrpSpPr>
-        <p:cNvPr id="35" name="Shape 35"/>
+        <p:cNvPr id="32" name="Shape 32"/>
         <p:cNvGrpSpPr/>
         <p:nvPr/>
       </p:nvGrpSpPr>
@@ -3705,7 +3885,7 @@
       </p:grpSpPr>
       <p:sp>
         <p:nvSpPr>
-          <p:cNvPr id="36" name="Google Shape;36;p8"/>
+          <p:cNvPr id="33" name="Google Shape;33;p8"/>
           <p:cNvSpPr txBox="1"/>
           <p:nvPr>
             <p:ph type="title"/>
@@ -3713,8 +3893,8 @@
         </p:nvSpPr>
         <p:spPr>
           <a:xfrm>
-            <a:off x="490250" y="526350"/>
-            <a:ext cx="5797500" cy="4090800"/>
+            <a:off x="490250" y="450150"/>
+            <a:ext cx="6367800" cy="4090800"/>
           </a:xfrm>
           <a:prstGeom prst="rect">
             <a:avLst/>
@@ -3830,7 +4010,7 @@
       </p:sp>
       <p:sp>
         <p:nvSpPr>
-          <p:cNvPr id="37" name="Google Shape;37;p8"/>
+          <p:cNvPr id="34" name="Google Shape;34;p8"/>
           <p:cNvSpPr txBox="1"/>
           <p:nvPr>
             <p:ph idx="12" type="sldNum"/>
@@ -3918,7 +4098,7 @@
   <p:cSld name="SECTION_TITLE_AND_DESCRIPTION">
     <p:spTree>
       <p:nvGrpSpPr>
-        <p:cNvPr id="38" name="Shape 38"/>
+        <p:cNvPr id="35" name="Shape 35"/>
         <p:cNvGrpSpPr/>
         <p:nvPr/>
       </p:nvGrpSpPr>
@@ -3932,20 +4112,20 @@
       </p:grpSpPr>
       <p:sp>
         <p:nvSpPr>
-          <p:cNvPr id="39" name="Google Shape;39;p9"/>
+          <p:cNvPr id="36" name="Google Shape;36;p9"/>
           <p:cNvSpPr/>
           <p:nvPr/>
         </p:nvSpPr>
         <p:spPr>
           <a:xfrm>
-            <a:off x="4572000" y="75"/>
+            <a:off x="4572000" y="25"/>
             <a:ext cx="4572000" cy="5143500"/>
           </a:xfrm>
           <a:prstGeom prst="rect">
             <a:avLst/>
           </a:prstGeom>
           <a:solidFill>
-            <a:schemeClr val="dk1"/>
+            <a:schemeClr val="dk2"/>
           </a:solidFill>
           <a:ln>
             <a:noFill/>
@@ -3973,35 +4153,9 @@
           </a:p>
         </p:txBody>
       </p:sp>
-      <p:cxnSp>
-        <p:nvCxnSpPr>
-          <p:cNvPr id="40" name="Google Shape;40;p9"/>
-          <p:cNvCxnSpPr/>
-          <p:nvPr/>
-        </p:nvCxnSpPr>
-        <p:spPr>
-          <a:xfrm>
-            <a:off x="5029675" y="4495500"/>
-            <a:ext cx="468300" cy="0"/>
-          </a:xfrm>
-          <a:prstGeom prst="straightConnector1">
-            <a:avLst/>
-          </a:prstGeom>
-          <a:noFill/>
-          <a:ln cap="flat" cmpd="sng" w="19050">
-            <a:solidFill>
-              <a:schemeClr val="lt2"/>
-            </a:solidFill>
-            <a:prstDash val="solid"/>
-            <a:round/>
-            <a:headEnd len="sm" w="sm" type="none"/>
-            <a:tailEnd len="sm" w="sm" type="none"/>
-          </a:ln>
-        </p:spPr>
-      </p:cxnSp>
       <p:sp>
         <p:nvSpPr>
-          <p:cNvPr id="41" name="Google Shape;41;p9"/>
+          <p:cNvPr id="37" name="Google Shape;37;p9"/>
           <p:cNvSpPr txBox="1"/>
           <p:nvPr>
             <p:ph type="title"/>
@@ -4009,8 +4163,8 @@
         </p:nvSpPr>
         <p:spPr>
           <a:xfrm>
-            <a:off x="265500" y="1205825"/>
-            <a:ext cx="4045200" cy="1509600"/>
+            <a:off x="265500" y="1233175"/>
+            <a:ext cx="4045200" cy="1482300"/>
           </a:xfrm>
           <a:prstGeom prst="rect">
             <a:avLst/>
@@ -4126,7 +4280,7 @@
       </p:sp>
       <p:sp>
         <p:nvSpPr>
-          <p:cNvPr id="42" name="Google Shape;42;p9"/>
+          <p:cNvPr id="38" name="Google Shape;38;p9"/>
           <p:cNvSpPr txBox="1"/>
           <p:nvPr>
             <p:ph idx="1" type="subTitle"/>
@@ -4134,8 +4288,8 @@
         </p:nvSpPr>
         <p:spPr>
           <a:xfrm>
-            <a:off x="265500" y="2769001"/>
-            <a:ext cx="4045200" cy="1345500"/>
+            <a:off x="265500" y="2803075"/>
+            <a:ext cx="4045200" cy="1235100"/>
           </a:xfrm>
           <a:prstGeom prst="rect">
             <a:avLst/>
@@ -4278,7 +4432,7 @@
       </p:sp>
       <p:sp>
         <p:nvSpPr>
-          <p:cNvPr id="43" name="Google Shape;43;p9"/>
+          <p:cNvPr id="39" name="Google Shape;39;p9"/>
           <p:cNvSpPr txBox="1"/>
           <p:nvPr>
             <p:ph idx="2" type="body"/>
@@ -4306,13 +4460,13 @@
                 <a:spcPts val="0"/>
               </a:spcAft>
               <a:buClr>
-                <a:schemeClr val="lt1"/>
+                <a:schemeClr val="dk1"/>
               </a:buClr>
               <a:buSzPts val="1800"/>
               <a:buChar char="●"/>
               <a:defRPr>
                 <a:solidFill>
-                  <a:schemeClr val="lt1"/>
+                  <a:schemeClr val="dk1"/>
                 </a:solidFill>
               </a:defRPr>
             </a:lvl1pPr>
@@ -4324,13 +4478,13 @@
                 <a:spcPts val="0"/>
               </a:spcAft>
               <a:buClr>
-                <a:schemeClr val="lt1"/>
+                <a:schemeClr val="dk1"/>
               </a:buClr>
               <a:buSzPts val="1400"/>
               <a:buChar char="○"/>
               <a:defRPr>
                 <a:solidFill>
-                  <a:schemeClr val="lt1"/>
+                  <a:schemeClr val="dk1"/>
                 </a:solidFill>
               </a:defRPr>
             </a:lvl2pPr>
@@ -4342,13 +4496,13 @@
                 <a:spcPts val="0"/>
               </a:spcAft>
               <a:buClr>
-                <a:schemeClr val="lt1"/>
+                <a:schemeClr val="dk1"/>
               </a:buClr>
               <a:buSzPts val="1400"/>
               <a:buChar char="■"/>
               <a:defRPr>
                 <a:solidFill>
-                  <a:schemeClr val="lt1"/>
+                  <a:schemeClr val="dk1"/>
                 </a:solidFill>
               </a:defRPr>
             </a:lvl3pPr>
@@ -4360,13 +4514,13 @@
                 <a:spcPts val="0"/>
               </a:spcAft>
               <a:buClr>
-                <a:schemeClr val="lt1"/>
+                <a:schemeClr val="dk1"/>
               </a:buClr>
               <a:buSzPts val="1400"/>
               <a:buChar char="●"/>
               <a:defRPr>
                 <a:solidFill>
-                  <a:schemeClr val="lt1"/>
+                  <a:schemeClr val="dk1"/>
                 </a:solidFill>
               </a:defRPr>
             </a:lvl4pPr>
@@ -4378,13 +4532,13 @@
                 <a:spcPts val="0"/>
               </a:spcAft>
               <a:buClr>
-                <a:schemeClr val="lt1"/>
+                <a:schemeClr val="dk1"/>
               </a:buClr>
               <a:buSzPts val="1400"/>
               <a:buChar char="○"/>
               <a:defRPr>
                 <a:solidFill>
-                  <a:schemeClr val="lt1"/>
+                  <a:schemeClr val="dk1"/>
                 </a:solidFill>
               </a:defRPr>
             </a:lvl5pPr>
@@ -4396,13 +4550,13 @@
                 <a:spcPts val="0"/>
               </a:spcAft>
               <a:buClr>
-                <a:schemeClr val="lt1"/>
+                <a:schemeClr val="dk1"/>
               </a:buClr>
               <a:buSzPts val="1400"/>
               <a:buChar char="■"/>
               <a:defRPr>
                 <a:solidFill>
-                  <a:schemeClr val="lt1"/>
+                  <a:schemeClr val="dk1"/>
                 </a:solidFill>
               </a:defRPr>
             </a:lvl6pPr>
@@ -4414,13 +4568,13 @@
                 <a:spcPts val="0"/>
               </a:spcAft>
               <a:buClr>
-                <a:schemeClr val="lt1"/>
+                <a:schemeClr val="dk1"/>
               </a:buClr>
               <a:buSzPts val="1400"/>
               <a:buChar char="●"/>
               <a:defRPr>
                 <a:solidFill>
-                  <a:schemeClr val="lt1"/>
+                  <a:schemeClr val="dk1"/>
                 </a:solidFill>
               </a:defRPr>
             </a:lvl7pPr>
@@ -4432,13 +4586,13 @@
                 <a:spcPts val="0"/>
               </a:spcAft>
               <a:buClr>
-                <a:schemeClr val="lt1"/>
+                <a:schemeClr val="dk1"/>
               </a:buClr>
               <a:buSzPts val="1400"/>
               <a:buChar char="○"/>
               <a:defRPr>
                 <a:solidFill>
-                  <a:schemeClr val="lt1"/>
+                  <a:schemeClr val="dk1"/>
                 </a:solidFill>
               </a:defRPr>
             </a:lvl8pPr>
@@ -4450,13 +4604,13 @@
                 <a:spcPts val="0"/>
               </a:spcAft>
               <a:buClr>
-                <a:schemeClr val="lt1"/>
+                <a:schemeClr val="dk1"/>
               </a:buClr>
               <a:buSzPts val="1400"/>
               <a:buChar char="■"/>
               <a:defRPr>
                 <a:solidFill>
-                  <a:schemeClr val="lt1"/>
+                  <a:schemeClr val="dk1"/>
                 </a:solidFill>
               </a:defRPr>
             </a:lvl9pPr>
@@ -4466,7 +4620,7 @@
       </p:sp>
       <p:sp>
         <p:nvSpPr>
-          <p:cNvPr id="44" name="Google Shape;44;p9"/>
+          <p:cNvPr id="40" name="Google Shape;40;p9"/>
           <p:cNvSpPr txBox="1"/>
           <p:nvPr>
             <p:ph idx="12" type="sldNum"/>
@@ -4488,75 +4642,39 @@
           <a:lstStyle>
             <a:lvl1pPr lvl="0">
               <a:buNone/>
-              <a:defRPr>
-                <a:solidFill>
-                  <a:schemeClr val="lt1"/>
-                </a:solidFill>
-              </a:defRPr>
+              <a:defRPr/>
             </a:lvl1pPr>
             <a:lvl2pPr lvl="1">
               <a:buNone/>
-              <a:defRPr>
-                <a:solidFill>
-                  <a:schemeClr val="lt1"/>
-                </a:solidFill>
-              </a:defRPr>
+              <a:defRPr/>
             </a:lvl2pPr>
             <a:lvl3pPr lvl="2">
               <a:buNone/>
-              <a:defRPr>
-                <a:solidFill>
-                  <a:schemeClr val="lt1"/>
-                </a:solidFill>
-              </a:defRPr>
+              <a:defRPr/>
             </a:lvl3pPr>
             <a:lvl4pPr lvl="3">
               <a:buNone/>
-              <a:defRPr>
-                <a:solidFill>
-                  <a:schemeClr val="lt1"/>
-                </a:solidFill>
-              </a:defRPr>
+              <a:defRPr/>
             </a:lvl4pPr>
             <a:lvl5pPr lvl="4">
               <a:buNone/>
-              <a:defRPr>
-                <a:solidFill>
-                  <a:schemeClr val="lt1"/>
-                </a:solidFill>
-              </a:defRPr>
+              <a:defRPr/>
             </a:lvl5pPr>
             <a:lvl6pPr lvl="5">
               <a:buNone/>
-              <a:defRPr>
-                <a:solidFill>
-                  <a:schemeClr val="lt1"/>
-                </a:solidFill>
-              </a:defRPr>
+              <a:defRPr/>
             </a:lvl6pPr>
             <a:lvl7pPr lvl="6">
               <a:buNone/>
-              <a:defRPr>
-                <a:solidFill>
-                  <a:schemeClr val="lt1"/>
-                </a:solidFill>
-              </a:defRPr>
+              <a:defRPr/>
             </a:lvl7pPr>
             <a:lvl8pPr lvl="7">
               <a:buNone/>
-              <a:defRPr>
-                <a:solidFill>
-                  <a:schemeClr val="lt1"/>
-                </a:solidFill>
-              </a:defRPr>
+              <a:defRPr/>
             </a:lvl8pPr>
             <a:lvl9pPr lvl="8">
               <a:buNone/>
-              <a:defRPr>
-                <a:solidFill>
-                  <a:schemeClr val="lt1"/>
-                </a:solidFill>
-              </a:defRPr>
+              <a:defRPr/>
             </a:lvl9pPr>
           </a:lstStyle>
           <a:p>
@@ -4590,7 +4708,7 @@
   <p:cSld name="CAPTION_ONLY">
     <p:spTree>
       <p:nvGrpSpPr>
-        <p:cNvPr id="45" name="Shape 45"/>
+        <p:cNvPr id="41" name="Shape 41"/>
         <p:cNvGrpSpPr/>
         <p:nvPr/>
       </p:nvGrpSpPr>
@@ -4604,7 +4722,7 @@
       </p:grpSpPr>
       <p:sp>
         <p:nvSpPr>
-          <p:cNvPr id="46" name="Google Shape;46;p10"/>
+          <p:cNvPr id="42" name="Google Shape;42;p10"/>
           <p:cNvSpPr txBox="1"/>
           <p:nvPr>
             <p:ph idx="1" type="body"/>
@@ -4612,8 +4730,8 @@
         </p:nvSpPr>
         <p:spPr>
           <a:xfrm>
-            <a:off x="311700" y="4236825"/>
-            <a:ext cx="5998800" cy="598800"/>
+            <a:off x="311700" y="4230575"/>
+            <a:ext cx="5998800" cy="605100"/>
           </a:xfrm>
           <a:prstGeom prst="rect">
             <a:avLst/>
@@ -4634,9 +4752,9 @@
               <a:spcAft>
                 <a:spcPts val="0"/>
               </a:spcAft>
-              <a:buSzPts val="2100"/>
-              <a:buNone/>
-              <a:defRPr sz="2100"/>
+              <a:buSzPts val="1800"/>
+              <a:buNone/>
+              <a:defRPr/>
             </a:lvl1pPr>
           </a:lstStyle>
           <a:p/>
@@ -4644,7 +4762,7 @@
       </p:sp>
       <p:sp>
         <p:nvSpPr>
-          <p:cNvPr id="47" name="Google Shape;47;p10"/>
+          <p:cNvPr id="43" name="Google Shape;43;p10"/>
           <p:cNvSpPr txBox="1"/>
           <p:nvPr>
             <p:ph idx="12" type="sldNum"/>
@@ -4729,7 +4847,7 @@
 
 <file path=ppt/slideMasters/slideMaster1.xml><?xml version="1.0" encoding="utf-8"?>
 <p:sldMaster xmlns:a="http://schemas.openxmlformats.org/drawingml/2006/main" xmlns:r="http://schemas.openxmlformats.org/officeDocument/2006/relationships" xmlns:mc="http://schemas.openxmlformats.org/markup-compatibility/2006" xmlns:mv="urn:schemas-microsoft-com:mac:vml" xmlns:p="http://schemas.openxmlformats.org/presentationml/2006/main" xmlns:c="http://schemas.openxmlformats.org/drawingml/2006/chart" xmlns:dgm="http://schemas.openxmlformats.org/drawingml/2006/diagram" xmlns:o="urn:schemas-microsoft-com:office:office" xmlns:v="urn:schemas-microsoft-com:vml" xmlns:pvml="urn:schemas-microsoft-com:office:powerpoint" xmlns:com="http://schemas.openxmlformats.org/drawingml/2006/compatibility" xmlns:p14="http://schemas.microsoft.com/office/powerpoint/2010/main" xmlns:p15="http://schemas.microsoft.com/office/powerpoint/2012/main" xmlns:ahyp="http://schemas.microsoft.com/office/drawing/2018/hyperlinkcolor">
-  <p:cSld name="spearmint">
+  <p:cSld name="simple-dark-2">
     <p:bg>
       <p:bgPr>
         <a:solidFill>
@@ -4788,16 +4906,11 @@
                 <a:schemeClr val="dk1"/>
               </a:buClr>
               <a:buSzPts val="2800"/>
-              <a:buFont typeface="Proxima Nova"/>
               <a:buNone/>
               <a:defRPr sz="2800">
                 <a:solidFill>
                   <a:schemeClr val="dk1"/>
                 </a:solidFill>
-                <a:latin typeface="Proxima Nova"/>
-                <a:ea typeface="Proxima Nova"/>
-                <a:cs typeface="Proxima Nova"/>
-                <a:sym typeface="Proxima Nova"/>
               </a:defRPr>
             </a:lvl1pPr>
             <a:lvl2pPr lvl="1">
@@ -4811,16 +4924,11 @@
                 <a:schemeClr val="dk1"/>
               </a:buClr>
               <a:buSzPts val="2800"/>
-              <a:buFont typeface="Proxima Nova"/>
               <a:buNone/>
               <a:defRPr sz="2800">
                 <a:solidFill>
                   <a:schemeClr val="dk1"/>
                 </a:solidFill>
-                <a:latin typeface="Proxima Nova"/>
-                <a:ea typeface="Proxima Nova"/>
-                <a:cs typeface="Proxima Nova"/>
-                <a:sym typeface="Proxima Nova"/>
               </a:defRPr>
             </a:lvl2pPr>
             <a:lvl3pPr lvl="2">
@@ -4834,16 +4942,11 @@
                 <a:schemeClr val="dk1"/>
               </a:buClr>
               <a:buSzPts val="2800"/>
-              <a:buFont typeface="Proxima Nova"/>
               <a:buNone/>
               <a:defRPr sz="2800">
                 <a:solidFill>
                   <a:schemeClr val="dk1"/>
                 </a:solidFill>
-                <a:latin typeface="Proxima Nova"/>
-                <a:ea typeface="Proxima Nova"/>
-                <a:cs typeface="Proxima Nova"/>
-                <a:sym typeface="Proxima Nova"/>
               </a:defRPr>
             </a:lvl3pPr>
             <a:lvl4pPr lvl="3">
@@ -4857,16 +4960,11 @@
                 <a:schemeClr val="dk1"/>
               </a:buClr>
               <a:buSzPts val="2800"/>
-              <a:buFont typeface="Proxima Nova"/>
               <a:buNone/>
               <a:defRPr sz="2800">
                 <a:solidFill>
                   <a:schemeClr val="dk1"/>
                 </a:solidFill>
-                <a:latin typeface="Proxima Nova"/>
-                <a:ea typeface="Proxima Nova"/>
-                <a:cs typeface="Proxima Nova"/>
-                <a:sym typeface="Proxima Nova"/>
               </a:defRPr>
             </a:lvl4pPr>
             <a:lvl5pPr lvl="4">
@@ -4880,16 +4978,11 @@
                 <a:schemeClr val="dk1"/>
               </a:buClr>
               <a:buSzPts val="2800"/>
-              <a:buFont typeface="Proxima Nova"/>
               <a:buNone/>
               <a:defRPr sz="2800">
                 <a:solidFill>
                   <a:schemeClr val="dk1"/>
                 </a:solidFill>
-                <a:latin typeface="Proxima Nova"/>
-                <a:ea typeface="Proxima Nova"/>
-                <a:cs typeface="Proxima Nova"/>
-                <a:sym typeface="Proxima Nova"/>
               </a:defRPr>
             </a:lvl5pPr>
             <a:lvl6pPr lvl="5">
@@ -4903,16 +4996,11 @@
                 <a:schemeClr val="dk1"/>
               </a:buClr>
               <a:buSzPts val="2800"/>
-              <a:buFont typeface="Proxima Nova"/>
               <a:buNone/>
               <a:defRPr sz="2800">
                 <a:solidFill>
                   <a:schemeClr val="dk1"/>
                 </a:solidFill>
-                <a:latin typeface="Proxima Nova"/>
-                <a:ea typeface="Proxima Nova"/>
-                <a:cs typeface="Proxima Nova"/>
-                <a:sym typeface="Proxima Nova"/>
               </a:defRPr>
             </a:lvl6pPr>
             <a:lvl7pPr lvl="6">
@@ -4926,16 +5014,11 @@
                 <a:schemeClr val="dk1"/>
               </a:buClr>
               <a:buSzPts val="2800"/>
-              <a:buFont typeface="Proxima Nova"/>
               <a:buNone/>
               <a:defRPr sz="2800">
                 <a:solidFill>
                   <a:schemeClr val="dk1"/>
                 </a:solidFill>
-                <a:latin typeface="Proxima Nova"/>
-                <a:ea typeface="Proxima Nova"/>
-                <a:cs typeface="Proxima Nova"/>
-                <a:sym typeface="Proxima Nova"/>
               </a:defRPr>
             </a:lvl7pPr>
             <a:lvl8pPr lvl="7">
@@ -4949,16 +5032,11 @@
                 <a:schemeClr val="dk1"/>
               </a:buClr>
               <a:buSzPts val="2800"/>
-              <a:buFont typeface="Proxima Nova"/>
               <a:buNone/>
               <a:defRPr sz="2800">
                 <a:solidFill>
                   <a:schemeClr val="dk1"/>
                 </a:solidFill>
-                <a:latin typeface="Proxima Nova"/>
-                <a:ea typeface="Proxima Nova"/>
-                <a:cs typeface="Proxima Nova"/>
-                <a:sym typeface="Proxima Nova"/>
               </a:defRPr>
             </a:lvl8pPr>
             <a:lvl9pPr lvl="8">
@@ -4972,16 +5050,11 @@
                 <a:schemeClr val="dk1"/>
               </a:buClr>
               <a:buSzPts val="2800"/>
-              <a:buFont typeface="Proxima Nova"/>
               <a:buNone/>
               <a:defRPr sz="2800">
                 <a:solidFill>
                   <a:schemeClr val="dk1"/>
                 </a:solidFill>
-                <a:latin typeface="Proxima Nova"/>
-                <a:ea typeface="Proxima Nova"/>
-                <a:cs typeface="Proxima Nova"/>
-                <a:sym typeface="Proxima Nova"/>
               </a:defRPr>
             </a:lvl9pPr>
           </a:lstStyle>
@@ -5025,19 +5098,14 @@
                 <a:spcPts val="0"/>
               </a:spcAft>
               <a:buClr>
-                <a:schemeClr val="accent3"/>
+                <a:schemeClr val="lt2"/>
               </a:buClr>
               <a:buSzPts val="1800"/>
-              <a:buFont typeface="Proxima Nova"/>
               <a:buChar char="●"/>
               <a:defRPr sz="1800">
                 <a:solidFill>
-                  <a:schemeClr val="accent3"/>
+                  <a:schemeClr val="lt2"/>
                 </a:solidFill>
-                <a:latin typeface="Proxima Nova"/>
-                <a:ea typeface="Proxima Nova"/>
-                <a:cs typeface="Proxima Nova"/>
-                <a:sym typeface="Proxima Nova"/>
               </a:defRPr>
             </a:lvl1pPr>
             <a:lvl2pPr indent="-317500" lvl="1" marL="914400">
@@ -5051,19 +5119,14 @@
                 <a:spcPts val="0"/>
               </a:spcAft>
               <a:buClr>
-                <a:schemeClr val="accent3"/>
+                <a:schemeClr val="lt2"/>
               </a:buClr>
               <a:buSzPts val="1400"/>
-              <a:buFont typeface="Proxima Nova"/>
               <a:buChar char="○"/>
               <a:defRPr>
                 <a:solidFill>
-                  <a:schemeClr val="accent3"/>
+                  <a:schemeClr val="lt2"/>
                 </a:solidFill>
-                <a:latin typeface="Proxima Nova"/>
-                <a:ea typeface="Proxima Nova"/>
-                <a:cs typeface="Proxima Nova"/>
-                <a:sym typeface="Proxima Nova"/>
               </a:defRPr>
             </a:lvl2pPr>
             <a:lvl3pPr indent="-317500" lvl="2" marL="1371600">
@@ -5077,19 +5140,14 @@
                 <a:spcPts val="0"/>
               </a:spcAft>
               <a:buClr>
-                <a:schemeClr val="accent3"/>
+                <a:schemeClr val="lt2"/>
               </a:buClr>
               <a:buSzPts val="1400"/>
-              <a:buFont typeface="Proxima Nova"/>
               <a:buChar char="■"/>
               <a:defRPr>
                 <a:solidFill>
-                  <a:schemeClr val="accent3"/>
+                  <a:schemeClr val="lt2"/>
                 </a:solidFill>
-                <a:latin typeface="Proxima Nova"/>
-                <a:ea typeface="Proxima Nova"/>
-                <a:cs typeface="Proxima Nova"/>
-                <a:sym typeface="Proxima Nova"/>
               </a:defRPr>
             </a:lvl3pPr>
             <a:lvl4pPr indent="-317500" lvl="3" marL="1828800">
@@ -5103,19 +5161,14 @@
                 <a:spcPts val="0"/>
               </a:spcAft>
               <a:buClr>
-                <a:schemeClr val="accent3"/>
+                <a:schemeClr val="lt2"/>
               </a:buClr>
               <a:buSzPts val="1400"/>
-              <a:buFont typeface="Proxima Nova"/>
               <a:buChar char="●"/>
               <a:defRPr>
                 <a:solidFill>
-                  <a:schemeClr val="accent3"/>
+                  <a:schemeClr val="lt2"/>
                 </a:solidFill>
-                <a:latin typeface="Proxima Nova"/>
-                <a:ea typeface="Proxima Nova"/>
-                <a:cs typeface="Proxima Nova"/>
-                <a:sym typeface="Proxima Nova"/>
               </a:defRPr>
             </a:lvl4pPr>
             <a:lvl5pPr indent="-317500" lvl="4" marL="2286000">
@@ -5129,19 +5182,14 @@
                 <a:spcPts val="0"/>
               </a:spcAft>
               <a:buClr>
-                <a:schemeClr val="accent3"/>
+                <a:schemeClr val="lt2"/>
               </a:buClr>
               <a:buSzPts val="1400"/>
-              <a:buFont typeface="Proxima Nova"/>
               <a:buChar char="○"/>
               <a:defRPr>
                 <a:solidFill>
-                  <a:schemeClr val="accent3"/>
+                  <a:schemeClr val="lt2"/>
                 </a:solidFill>
-                <a:latin typeface="Proxima Nova"/>
-                <a:ea typeface="Proxima Nova"/>
-                <a:cs typeface="Proxima Nova"/>
-                <a:sym typeface="Proxima Nova"/>
               </a:defRPr>
             </a:lvl5pPr>
             <a:lvl6pPr indent="-317500" lvl="5" marL="2743200">
@@ -5155,19 +5203,14 @@
                 <a:spcPts val="0"/>
               </a:spcAft>
               <a:buClr>
-                <a:schemeClr val="accent3"/>
+                <a:schemeClr val="lt2"/>
               </a:buClr>
               <a:buSzPts val="1400"/>
-              <a:buFont typeface="Proxima Nova"/>
               <a:buChar char="■"/>
               <a:defRPr>
                 <a:solidFill>
-                  <a:schemeClr val="accent3"/>
+                  <a:schemeClr val="lt2"/>
                 </a:solidFill>
-                <a:latin typeface="Proxima Nova"/>
-                <a:ea typeface="Proxima Nova"/>
-                <a:cs typeface="Proxima Nova"/>
-                <a:sym typeface="Proxima Nova"/>
               </a:defRPr>
             </a:lvl6pPr>
             <a:lvl7pPr indent="-317500" lvl="6" marL="3200400">
@@ -5181,19 +5224,14 @@
                 <a:spcPts val="0"/>
               </a:spcAft>
               <a:buClr>
-                <a:schemeClr val="accent3"/>
+                <a:schemeClr val="lt2"/>
               </a:buClr>
               <a:buSzPts val="1400"/>
-              <a:buFont typeface="Proxima Nova"/>
               <a:buChar char="●"/>
               <a:defRPr>
                 <a:solidFill>
-                  <a:schemeClr val="accent3"/>
+                  <a:schemeClr val="lt2"/>
                 </a:solidFill>
-                <a:latin typeface="Proxima Nova"/>
-                <a:ea typeface="Proxima Nova"/>
-                <a:cs typeface="Proxima Nova"/>
-                <a:sym typeface="Proxima Nova"/>
               </a:defRPr>
             </a:lvl7pPr>
             <a:lvl8pPr indent="-317500" lvl="7" marL="3657600">
@@ -5207,19 +5245,14 @@
                 <a:spcPts val="0"/>
               </a:spcAft>
               <a:buClr>
-                <a:schemeClr val="accent3"/>
+                <a:schemeClr val="lt2"/>
               </a:buClr>
               <a:buSzPts val="1400"/>
-              <a:buFont typeface="Proxima Nova"/>
               <a:buChar char="○"/>
               <a:defRPr>
                 <a:solidFill>
-                  <a:schemeClr val="accent3"/>
+                  <a:schemeClr val="lt2"/>
                 </a:solidFill>
-                <a:latin typeface="Proxima Nova"/>
-                <a:ea typeface="Proxima Nova"/>
-                <a:cs typeface="Proxima Nova"/>
-                <a:sym typeface="Proxima Nova"/>
               </a:defRPr>
             </a:lvl8pPr>
             <a:lvl9pPr indent="-317500" lvl="8" marL="4114800">
@@ -5233,19 +5266,14 @@
                 <a:spcPts val="0"/>
               </a:spcAft>
               <a:buClr>
-                <a:schemeClr val="accent3"/>
+                <a:schemeClr val="lt2"/>
               </a:buClr>
               <a:buSzPts val="1400"/>
-              <a:buFont typeface="Proxima Nova"/>
               <a:buChar char="■"/>
               <a:defRPr>
                 <a:solidFill>
-                  <a:schemeClr val="accent3"/>
+                  <a:schemeClr val="lt2"/>
                 </a:solidFill>
-                <a:latin typeface="Proxima Nova"/>
-                <a:ea typeface="Proxima Nova"/>
-                <a:cs typeface="Proxima Nova"/>
-                <a:sym typeface="Proxima Nova"/>
               </a:defRPr>
             </a:lvl9pPr>
           </a:lstStyle>
@@ -5282,108 +5310,72 @@
               <a:buNone/>
               <a:defRPr sz="1000">
                 <a:solidFill>
-                  <a:schemeClr val="dk1"/>
+                  <a:schemeClr val="lt2"/>
                 </a:solidFill>
-                <a:latin typeface="Proxima Nova"/>
-                <a:ea typeface="Proxima Nova"/>
-                <a:cs typeface="Proxima Nova"/>
-                <a:sym typeface="Proxima Nova"/>
               </a:defRPr>
             </a:lvl1pPr>
             <a:lvl2pPr lvl="1" algn="r">
               <a:buNone/>
               <a:defRPr sz="1000">
                 <a:solidFill>
-                  <a:schemeClr val="dk1"/>
+                  <a:schemeClr val="lt2"/>
                 </a:solidFill>
-                <a:latin typeface="Proxima Nova"/>
-                <a:ea typeface="Proxima Nova"/>
-                <a:cs typeface="Proxima Nova"/>
-                <a:sym typeface="Proxima Nova"/>
               </a:defRPr>
             </a:lvl2pPr>
             <a:lvl3pPr lvl="2" algn="r">
               <a:buNone/>
               <a:defRPr sz="1000">
                 <a:solidFill>
-                  <a:schemeClr val="dk1"/>
+                  <a:schemeClr val="lt2"/>
                 </a:solidFill>
-                <a:latin typeface="Proxima Nova"/>
-                <a:ea typeface="Proxima Nova"/>
-                <a:cs typeface="Proxima Nova"/>
-                <a:sym typeface="Proxima Nova"/>
               </a:defRPr>
             </a:lvl3pPr>
             <a:lvl4pPr lvl="3" algn="r">
               <a:buNone/>
               <a:defRPr sz="1000">
                 <a:solidFill>
-                  <a:schemeClr val="dk1"/>
+                  <a:schemeClr val="lt2"/>
                 </a:solidFill>
-                <a:latin typeface="Proxima Nova"/>
-                <a:ea typeface="Proxima Nova"/>
-                <a:cs typeface="Proxima Nova"/>
-                <a:sym typeface="Proxima Nova"/>
               </a:defRPr>
             </a:lvl4pPr>
             <a:lvl5pPr lvl="4" algn="r">
               <a:buNone/>
               <a:defRPr sz="1000">
                 <a:solidFill>
-                  <a:schemeClr val="dk1"/>
+                  <a:schemeClr val="lt2"/>
                 </a:solidFill>
-                <a:latin typeface="Proxima Nova"/>
-                <a:ea typeface="Proxima Nova"/>
-                <a:cs typeface="Proxima Nova"/>
-                <a:sym typeface="Proxima Nova"/>
               </a:defRPr>
             </a:lvl5pPr>
             <a:lvl6pPr lvl="5" algn="r">
               <a:buNone/>
               <a:defRPr sz="1000">
                 <a:solidFill>
-                  <a:schemeClr val="dk1"/>
+                  <a:schemeClr val="lt2"/>
                 </a:solidFill>
-                <a:latin typeface="Proxima Nova"/>
-                <a:ea typeface="Proxima Nova"/>
-                <a:cs typeface="Proxima Nova"/>
-                <a:sym typeface="Proxima Nova"/>
               </a:defRPr>
             </a:lvl6pPr>
             <a:lvl7pPr lvl="6" algn="r">
               <a:buNone/>
               <a:defRPr sz="1000">
                 <a:solidFill>
-                  <a:schemeClr val="dk1"/>
+                  <a:schemeClr val="lt2"/>
                 </a:solidFill>
-                <a:latin typeface="Proxima Nova"/>
-                <a:ea typeface="Proxima Nova"/>
-                <a:cs typeface="Proxima Nova"/>
-                <a:sym typeface="Proxima Nova"/>
               </a:defRPr>
             </a:lvl7pPr>
             <a:lvl8pPr lvl="7" algn="r">
               <a:buNone/>
               <a:defRPr sz="1000">
                 <a:solidFill>
-                  <a:schemeClr val="dk1"/>
+                  <a:schemeClr val="lt2"/>
                 </a:solidFill>
-                <a:latin typeface="Proxima Nova"/>
-                <a:ea typeface="Proxima Nova"/>
-                <a:cs typeface="Proxima Nova"/>
-                <a:sym typeface="Proxima Nova"/>
               </a:defRPr>
             </a:lvl8pPr>
             <a:lvl9pPr lvl="8" algn="r">
               <a:buNone/>
               <a:defRPr sz="1000">
                 <a:solidFill>
-                  <a:schemeClr val="dk1"/>
+                  <a:schemeClr val="lt2"/>
                 </a:solidFill>
-                <a:latin typeface="Proxima Nova"/>
-                <a:ea typeface="Proxima Nova"/>
-                <a:cs typeface="Proxima Nova"/>
-                <a:sym typeface="Proxima Nova"/>
               </a:defRPr>
             </a:lvl9pPr>
           </a:lstStyle>
@@ -6119,6 +6111,59 @@
   <p:cSld>
     <p:spTree>
       <p:nvGrpSpPr>
+        <p:cNvPr id="53" name="Shape 53"/>
+        <p:cNvGrpSpPr/>
+        <p:nvPr/>
+      </p:nvGrpSpPr>
+      <p:grpSpPr>
+        <a:xfrm>
+          <a:off x="0" y="0"/>
+          <a:ext cx="0" cy="0"/>
+          <a:chOff x="0" y="0"/>
+          <a:chExt cx="0" cy="0"/>
+        </a:xfrm>
+      </p:grpSpPr>
+      <p:pic>
+        <p:nvPicPr>
+          <p:cNvPr id="54" name="Google Shape;54;p13"/>
+          <p:cNvPicPr preferRelativeResize="0"/>
+          <p:nvPr/>
+        </p:nvPicPr>
+        <p:blipFill>
+          <a:blip r:embed="rId3">
+            <a:alphaModFix/>
+          </a:blip>
+          <a:stretch>
+            <a:fillRect/>
+          </a:stretch>
+        </p:blipFill>
+        <p:spPr>
+          <a:xfrm>
+            <a:off x="217675" y="1029950"/>
+            <a:ext cx="8708625" cy="3206000"/>
+          </a:xfrm>
+          <a:prstGeom prst="rect">
+            <a:avLst/>
+          </a:prstGeom>
+          <a:noFill/>
+          <a:ln>
+            <a:noFill/>
+          </a:ln>
+        </p:spPr>
+      </p:pic>
+    </p:spTree>
+  </p:cSld>
+  <p:clrMapOvr>
+    <a:masterClrMapping/>
+  </p:clrMapOvr>
+</p:sld>
+</file>
+
+<file path=ppt/slides/slide2.xml><?xml version="1.0" encoding="utf-8"?>
+<p:sld xmlns:a="http://schemas.openxmlformats.org/drawingml/2006/main" xmlns:r="http://schemas.openxmlformats.org/officeDocument/2006/relationships" xmlns:mc="http://schemas.openxmlformats.org/markup-compatibility/2006" xmlns:mv="urn:schemas-microsoft-com:mac:vml" xmlns:p="http://schemas.openxmlformats.org/presentationml/2006/main" xmlns:c="http://schemas.openxmlformats.org/drawingml/2006/chart" xmlns:dgm="http://schemas.openxmlformats.org/drawingml/2006/diagram" xmlns:o="urn:schemas-microsoft-com:office:office" xmlns:v="urn:schemas-microsoft-com:vml" xmlns:pvml="urn:schemas-microsoft-com:office:powerpoint" xmlns:com="http://schemas.openxmlformats.org/drawingml/2006/compatibility" xmlns:p14="http://schemas.microsoft.com/office/powerpoint/2010/main" xmlns:p15="http://schemas.microsoft.com/office/powerpoint/2012/main" xmlns:ahyp="http://schemas.microsoft.com/office/drawing/2018/hyperlinkcolor">
+  <p:cSld>
+    <p:spTree>
+      <p:nvGrpSpPr>
         <p:cNvPr id="58" name="Shape 58"/>
         <p:cNvGrpSpPr/>
         <p:nvPr/>
@@ -6133,7 +6178,7 @@
       </p:grpSpPr>
       <p:sp>
         <p:nvSpPr>
-          <p:cNvPr id="59" name="Google Shape;59;p13"/>
+          <p:cNvPr id="59" name="Google Shape;59;p14"/>
           <p:cNvSpPr txBox="1"/>
           <p:nvPr>
             <p:ph type="ctrTitle"/>
@@ -6141,8 +6186,8 @@
         </p:nvSpPr>
         <p:spPr>
           <a:xfrm>
-            <a:off x="510450" y="1257300"/>
-            <a:ext cx="8123100" cy="1588500"/>
+            <a:off x="311708" y="744575"/>
+            <a:ext cx="8520600" cy="2052600"/>
           </a:xfrm>
           <a:prstGeom prst="rect">
             <a:avLst/>
@@ -6157,7 +6202,7 @@
           </a:bodyPr>
           <a:lstStyle/>
           <a:p>
-            <a:pPr indent="0" lvl="0" marL="0" rtl="0" algn="l">
+            <a:pPr indent="0" lvl="0" marL="0" rtl="0" algn="ctr">
               <a:spcBef>
                 <a:spcPts val="0"/>
               </a:spcBef>
@@ -6169,31 +6214,64 @@
             <a:r>
               <a:rPr lang="en">
                 <a:solidFill>
-                  <a:srgbClr val="00FF00"/>
+                  <a:srgbClr val="FFFF00"/>
                 </a:solidFill>
+                <a:latin typeface="Roboto Serif"/>
+                <a:ea typeface="Roboto Serif"/>
+                <a:cs typeface="Roboto Serif"/>
+                <a:sym typeface="Roboto Serif"/>
               </a:rPr>
               <a:t>Troubleshooting</a:t>
             </a:r>
             <a:endParaRPr>
               <a:solidFill>
-                <a:srgbClr val="00FF00"/>
+                <a:srgbClr val="FFFF00"/>
               </a:solidFill>
+              <a:latin typeface="Roboto Serif"/>
+              <a:ea typeface="Roboto Serif"/>
+              <a:cs typeface="Roboto Serif"/>
+              <a:sym typeface="Roboto Serif"/>
             </a:endParaRPr>
           </a:p>
         </p:txBody>
       </p:sp>
+    </p:spTree>
+  </p:cSld>
+  <p:clrMapOvr>
+    <a:masterClrMapping/>
+  </p:clrMapOvr>
+</p:sld>
+</file>
+
+<file path=ppt/slides/slide3.xml><?xml version="1.0" encoding="utf-8"?>
+<p:sld xmlns:a="http://schemas.openxmlformats.org/drawingml/2006/main" xmlns:r="http://schemas.openxmlformats.org/officeDocument/2006/relationships" xmlns:mc="http://schemas.openxmlformats.org/markup-compatibility/2006" xmlns:mv="urn:schemas-microsoft-com:mac:vml" xmlns:p="http://schemas.openxmlformats.org/presentationml/2006/main" xmlns:c="http://schemas.openxmlformats.org/drawingml/2006/chart" xmlns:dgm="http://schemas.openxmlformats.org/drawingml/2006/diagram" xmlns:o="urn:schemas-microsoft-com:office:office" xmlns:v="urn:schemas-microsoft-com:vml" xmlns:pvml="urn:schemas-microsoft-com:office:powerpoint" xmlns:com="http://schemas.openxmlformats.org/drawingml/2006/compatibility" xmlns:p14="http://schemas.microsoft.com/office/powerpoint/2010/main" xmlns:p15="http://schemas.microsoft.com/office/powerpoint/2012/main" xmlns:ahyp="http://schemas.microsoft.com/office/drawing/2018/hyperlinkcolor">
+  <p:cSld>
+    <p:spTree>
+      <p:nvGrpSpPr>
+        <p:cNvPr id="63" name="Shape 63"/>
+        <p:cNvGrpSpPr/>
+        <p:nvPr/>
+      </p:nvGrpSpPr>
+      <p:grpSpPr>
+        <a:xfrm>
+          <a:off x="0" y="0"/>
+          <a:ext cx="0" cy="0"/>
+          <a:chOff x="0" y="0"/>
+          <a:chExt cx="0" cy="0"/>
+        </a:xfrm>
+      </p:grpSpPr>
       <p:sp>
         <p:nvSpPr>
-          <p:cNvPr id="60" name="Google Shape;60;p13"/>
+          <p:cNvPr id="64" name="Google Shape;64;p15"/>
           <p:cNvSpPr txBox="1"/>
           <p:nvPr>
-            <p:ph idx="1" type="subTitle"/>
+            <p:ph type="title"/>
           </p:nvPr>
         </p:nvSpPr>
         <p:spPr>
           <a:xfrm>
-            <a:off x="510450" y="3182313"/>
-            <a:ext cx="8123100" cy="630000"/>
+            <a:off x="311700" y="445025"/>
+            <a:ext cx="8520600" cy="572700"/>
           </a:xfrm>
           <a:prstGeom prst="rect">
             <a:avLst/>
@@ -6201,6 +6279,456 @@
         </p:spPr>
         <p:txBody>
           <a:bodyPr anchorCtr="0" anchor="t" bIns="91425" lIns="91425" spcFirstLastPara="1" rIns="91425" wrap="square" tIns="91425">
+            <a:noAutofit/>
+          </a:bodyPr>
+          <a:lstStyle/>
+          <a:p>
+            <a:pPr indent="0" lvl="0" marL="0" marR="0" rtl="0" algn="l">
+              <a:lnSpc>
+                <a:spcPct val="100000"/>
+              </a:lnSpc>
+              <a:spcBef>
+                <a:spcPts val="0"/>
+              </a:spcBef>
+              <a:spcAft>
+                <a:spcPts val="0"/>
+              </a:spcAft>
+              <a:buSzPts val="990"/>
+              <a:buNone/>
+            </a:pPr>
+            <a:r>
+              <a:rPr lang="en" sz="3500">
+                <a:solidFill>
+                  <a:srgbClr val="FFFF00"/>
+                </a:solidFill>
+                <a:latin typeface="Roboto Serif"/>
+                <a:ea typeface="Roboto Serif"/>
+                <a:cs typeface="Roboto Serif"/>
+                <a:sym typeface="Roboto Serif"/>
+              </a:rPr>
+              <a:t>What Is Troubleshooting?</a:t>
+            </a:r>
+            <a:endParaRPr sz="3500">
+              <a:latin typeface="Roboto Serif"/>
+              <a:ea typeface="Roboto Serif"/>
+              <a:cs typeface="Roboto Serif"/>
+              <a:sym typeface="Roboto Serif"/>
+            </a:endParaRPr>
+          </a:p>
+        </p:txBody>
+      </p:sp>
+      <p:sp>
+        <p:nvSpPr>
+          <p:cNvPr id="65" name="Google Shape;65;p15"/>
+          <p:cNvSpPr txBox="1"/>
+          <p:nvPr>
+            <p:ph idx="1" type="body"/>
+          </p:nvPr>
+        </p:nvSpPr>
+        <p:spPr>
+          <a:xfrm>
+            <a:off x="311700" y="1152475"/>
+            <a:ext cx="8520600" cy="3416400"/>
+          </a:xfrm>
+          <a:prstGeom prst="rect">
+            <a:avLst/>
+          </a:prstGeom>
+        </p:spPr>
+        <p:txBody>
+          <a:bodyPr anchorCtr="0" anchor="t" bIns="91425" lIns="91425" spcFirstLastPara="1" rIns="91425" wrap="square" tIns="91425">
+            <a:normAutofit/>
+          </a:bodyPr>
+          <a:lstStyle/>
+          <a:p>
+            <a:pPr indent="0" lvl="0" marL="0" rtl="0" algn="l">
+              <a:spcBef>
+                <a:spcPts val="0"/>
+              </a:spcBef>
+              <a:spcAft>
+                <a:spcPts val="1200"/>
+              </a:spcAft>
+              <a:buNone/>
+            </a:pPr>
+            <a:r>
+              <a:t/>
+            </a:r>
+            <a:endParaRPr/>
+          </a:p>
+        </p:txBody>
+      </p:sp>
+    </p:spTree>
+  </p:cSld>
+  <p:clrMapOvr>
+    <a:masterClrMapping/>
+  </p:clrMapOvr>
+</p:sld>
+</file>
+
+<file path=ppt/slides/slide4.xml><?xml version="1.0" encoding="utf-8"?>
+<p:sld xmlns:a="http://schemas.openxmlformats.org/drawingml/2006/main" xmlns:r="http://schemas.openxmlformats.org/officeDocument/2006/relationships" xmlns:mc="http://schemas.openxmlformats.org/markup-compatibility/2006" xmlns:mv="urn:schemas-microsoft-com:mac:vml" xmlns:p="http://schemas.openxmlformats.org/presentationml/2006/main" xmlns:c="http://schemas.openxmlformats.org/drawingml/2006/chart" xmlns:dgm="http://schemas.openxmlformats.org/drawingml/2006/diagram" xmlns:o="urn:schemas-microsoft-com:office:office" xmlns:v="urn:schemas-microsoft-com:vml" xmlns:pvml="urn:schemas-microsoft-com:office:powerpoint" xmlns:com="http://schemas.openxmlformats.org/drawingml/2006/compatibility" xmlns:p14="http://schemas.microsoft.com/office/powerpoint/2010/main" xmlns:p15="http://schemas.microsoft.com/office/powerpoint/2012/main" xmlns:ahyp="http://schemas.microsoft.com/office/drawing/2018/hyperlinkcolor">
+  <p:cSld>
+    <p:spTree>
+      <p:nvGrpSpPr>
+        <p:cNvPr id="69" name="Shape 69"/>
+        <p:cNvGrpSpPr/>
+        <p:nvPr/>
+      </p:nvGrpSpPr>
+      <p:grpSpPr>
+        <a:xfrm>
+          <a:off x="0" y="0"/>
+          <a:ext cx="0" cy="0"/>
+          <a:chOff x="0" y="0"/>
+          <a:chExt cx="0" cy="0"/>
+        </a:xfrm>
+      </p:grpSpPr>
+      <p:sp>
+        <p:nvSpPr>
+          <p:cNvPr id="70" name="Google Shape;70;p16"/>
+          <p:cNvSpPr txBox="1"/>
+          <p:nvPr>
+            <p:ph type="title"/>
+          </p:nvPr>
+        </p:nvSpPr>
+        <p:spPr>
+          <a:xfrm>
+            <a:off x="311700" y="445025"/>
+            <a:ext cx="8520600" cy="572700"/>
+          </a:xfrm>
+          <a:prstGeom prst="rect">
+            <a:avLst/>
+          </a:prstGeom>
+        </p:spPr>
+        <p:txBody>
+          <a:bodyPr anchorCtr="0" anchor="t" bIns="91425" lIns="91425" spcFirstLastPara="1" rIns="91425" wrap="square" tIns="91425">
+            <a:normAutofit fontScale="90000"/>
+          </a:bodyPr>
+          <a:lstStyle/>
+          <a:p>
+            <a:pPr indent="0" lvl="0" marL="0" marR="0" rtl="0" algn="l">
+              <a:lnSpc>
+                <a:spcPct val="100000"/>
+              </a:lnSpc>
+              <a:spcBef>
+                <a:spcPts val="0"/>
+              </a:spcBef>
+              <a:spcAft>
+                <a:spcPts val="0"/>
+              </a:spcAft>
+              <a:buClr>
+                <a:srgbClr val="000000"/>
+              </a:buClr>
+              <a:buSzPct val="28285"/>
+              <a:buFont typeface="Arial"/>
+              <a:buNone/>
+            </a:pPr>
+            <a:r>
+              <a:rPr lang="en" sz="3500">
+                <a:solidFill>
+                  <a:srgbClr val="FFFF00"/>
+                </a:solidFill>
+                <a:latin typeface="Roboto Serif"/>
+                <a:ea typeface="Roboto Serif"/>
+                <a:cs typeface="Roboto Serif"/>
+                <a:sym typeface="Roboto Serif"/>
+              </a:rPr>
+              <a:t>When Do We Use Troubleshooting?</a:t>
+            </a:r>
+            <a:endParaRPr sz="3500">
+              <a:solidFill>
+                <a:srgbClr val="FFFF00"/>
+              </a:solidFill>
+              <a:latin typeface="Roboto Serif"/>
+              <a:ea typeface="Roboto Serif"/>
+              <a:cs typeface="Roboto Serif"/>
+              <a:sym typeface="Roboto Serif"/>
+            </a:endParaRPr>
+          </a:p>
+        </p:txBody>
+      </p:sp>
+      <p:sp>
+        <p:nvSpPr>
+          <p:cNvPr id="71" name="Google Shape;71;p16"/>
+          <p:cNvSpPr txBox="1"/>
+          <p:nvPr>
+            <p:ph idx="1" type="body"/>
+          </p:nvPr>
+        </p:nvSpPr>
+        <p:spPr>
+          <a:xfrm>
+            <a:off x="311700" y="1152475"/>
+            <a:ext cx="8520600" cy="3416400"/>
+          </a:xfrm>
+          <a:prstGeom prst="rect">
+            <a:avLst/>
+          </a:prstGeom>
+        </p:spPr>
+        <p:txBody>
+          <a:bodyPr anchorCtr="0" anchor="t" bIns="91425" lIns="91425" spcFirstLastPara="1" rIns="91425" wrap="square" tIns="91425">
+            <a:normAutofit/>
+          </a:bodyPr>
+          <a:lstStyle/>
+          <a:p>
+            <a:pPr indent="0" lvl="0" marL="0" rtl="0" algn="l">
+              <a:spcBef>
+                <a:spcPts val="0"/>
+              </a:spcBef>
+              <a:spcAft>
+                <a:spcPts val="1200"/>
+              </a:spcAft>
+              <a:buNone/>
+            </a:pPr>
+            <a:r>
+              <a:t/>
+            </a:r>
+            <a:endParaRPr/>
+          </a:p>
+        </p:txBody>
+      </p:sp>
+    </p:spTree>
+  </p:cSld>
+  <p:clrMapOvr>
+    <a:masterClrMapping/>
+  </p:clrMapOvr>
+</p:sld>
+</file>
+
+<file path=ppt/slides/slide5.xml><?xml version="1.0" encoding="utf-8"?>
+<p:sld xmlns:a="http://schemas.openxmlformats.org/drawingml/2006/main" xmlns:r="http://schemas.openxmlformats.org/officeDocument/2006/relationships" xmlns:mc="http://schemas.openxmlformats.org/markup-compatibility/2006" xmlns:mv="urn:schemas-microsoft-com:mac:vml" xmlns:p="http://schemas.openxmlformats.org/presentationml/2006/main" xmlns:c="http://schemas.openxmlformats.org/drawingml/2006/chart" xmlns:dgm="http://schemas.openxmlformats.org/drawingml/2006/diagram" xmlns:o="urn:schemas-microsoft-com:office:office" xmlns:v="urn:schemas-microsoft-com:vml" xmlns:pvml="urn:schemas-microsoft-com:office:powerpoint" xmlns:com="http://schemas.openxmlformats.org/drawingml/2006/compatibility" xmlns:p14="http://schemas.microsoft.com/office/powerpoint/2010/main" xmlns:p15="http://schemas.microsoft.com/office/powerpoint/2012/main" xmlns:ahyp="http://schemas.microsoft.com/office/drawing/2018/hyperlinkcolor">
+  <p:cSld>
+    <p:spTree>
+      <p:nvGrpSpPr>
+        <p:cNvPr id="75" name="Shape 75"/>
+        <p:cNvGrpSpPr/>
+        <p:nvPr/>
+      </p:nvGrpSpPr>
+      <p:grpSpPr>
+        <a:xfrm>
+          <a:off x="0" y="0"/>
+          <a:ext cx="0" cy="0"/>
+          <a:chOff x="0" y="0"/>
+          <a:chExt cx="0" cy="0"/>
+        </a:xfrm>
+      </p:grpSpPr>
+      <p:sp>
+        <p:nvSpPr>
+          <p:cNvPr id="76" name="Google Shape;76;p17"/>
+          <p:cNvSpPr txBox="1"/>
+          <p:nvPr>
+            <p:ph type="title"/>
+          </p:nvPr>
+        </p:nvSpPr>
+        <p:spPr>
+          <a:xfrm>
+            <a:off x="311700" y="445025"/>
+            <a:ext cx="8520600" cy="572700"/>
+          </a:xfrm>
+          <a:prstGeom prst="rect">
+            <a:avLst/>
+          </a:prstGeom>
+        </p:spPr>
+        <p:txBody>
+          <a:bodyPr anchorCtr="0" anchor="t" bIns="91425" lIns="91425" spcFirstLastPara="1" rIns="91425" wrap="square" tIns="91425">
+            <a:normAutofit fontScale="90000"/>
+          </a:bodyPr>
+          <a:lstStyle/>
+          <a:p>
+            <a:pPr indent="0" lvl="0" marL="0" marR="0" rtl="0" algn="l">
+              <a:lnSpc>
+                <a:spcPct val="100000"/>
+              </a:lnSpc>
+              <a:spcBef>
+                <a:spcPts val="0"/>
+              </a:spcBef>
+              <a:spcAft>
+                <a:spcPts val="0"/>
+              </a:spcAft>
+              <a:buClr>
+                <a:srgbClr val="000000"/>
+              </a:buClr>
+              <a:buSzPct val="28285"/>
+              <a:buFont typeface="Arial"/>
+              <a:buNone/>
+            </a:pPr>
+            <a:r>
+              <a:rPr lang="en" sz="3500">
+                <a:solidFill>
+                  <a:srgbClr val="FFFF00"/>
+                </a:solidFill>
+                <a:latin typeface="Roboto Serif"/>
+                <a:ea typeface="Roboto Serif"/>
+                <a:cs typeface="Roboto Serif"/>
+                <a:sym typeface="Roboto Serif"/>
+              </a:rPr>
+              <a:t>Why Should We Care?</a:t>
+            </a:r>
+            <a:endParaRPr sz="3500">
+              <a:solidFill>
+                <a:srgbClr val="FFFF00"/>
+              </a:solidFill>
+              <a:latin typeface="Roboto Serif"/>
+              <a:ea typeface="Roboto Serif"/>
+              <a:cs typeface="Roboto Serif"/>
+              <a:sym typeface="Roboto Serif"/>
+            </a:endParaRPr>
+          </a:p>
+        </p:txBody>
+      </p:sp>
+      <p:sp>
+        <p:nvSpPr>
+          <p:cNvPr id="77" name="Google Shape;77;p17"/>
+          <p:cNvSpPr txBox="1"/>
+          <p:nvPr>
+            <p:ph idx="1" type="body"/>
+          </p:nvPr>
+        </p:nvSpPr>
+        <p:spPr>
+          <a:xfrm>
+            <a:off x="311700" y="1152475"/>
+            <a:ext cx="8520600" cy="3416400"/>
+          </a:xfrm>
+          <a:prstGeom prst="rect">
+            <a:avLst/>
+          </a:prstGeom>
+        </p:spPr>
+        <p:txBody>
+          <a:bodyPr anchorCtr="0" anchor="t" bIns="91425" lIns="91425" spcFirstLastPara="1" rIns="91425" wrap="square" tIns="91425">
+            <a:normAutofit/>
+          </a:bodyPr>
+          <a:lstStyle/>
+          <a:p>
+            <a:pPr indent="0" lvl="0" marL="0" rtl="0" algn="l">
+              <a:spcBef>
+                <a:spcPts val="0"/>
+              </a:spcBef>
+              <a:spcAft>
+                <a:spcPts val="1200"/>
+              </a:spcAft>
+              <a:buNone/>
+            </a:pPr>
+            <a:r>
+              <a:t/>
+            </a:r>
+            <a:endParaRPr/>
+          </a:p>
+        </p:txBody>
+      </p:sp>
+    </p:spTree>
+  </p:cSld>
+  <p:clrMapOvr>
+    <a:masterClrMapping/>
+  </p:clrMapOvr>
+</p:sld>
+</file>
+
+<file path=ppt/slides/slide6.xml><?xml version="1.0" encoding="utf-8"?>
+<p:sld xmlns:a="http://schemas.openxmlformats.org/drawingml/2006/main" xmlns:r="http://schemas.openxmlformats.org/officeDocument/2006/relationships" xmlns:mc="http://schemas.openxmlformats.org/markup-compatibility/2006" xmlns:mv="urn:schemas-microsoft-com:mac:vml" xmlns:p="http://schemas.openxmlformats.org/presentationml/2006/main" xmlns:c="http://schemas.openxmlformats.org/drawingml/2006/chart" xmlns:dgm="http://schemas.openxmlformats.org/drawingml/2006/diagram" xmlns:o="urn:schemas-microsoft-com:office:office" xmlns:v="urn:schemas-microsoft-com:vml" xmlns:pvml="urn:schemas-microsoft-com:office:powerpoint" xmlns:com="http://schemas.openxmlformats.org/drawingml/2006/compatibility" xmlns:p14="http://schemas.microsoft.com/office/powerpoint/2010/main" xmlns:p15="http://schemas.microsoft.com/office/powerpoint/2012/main" xmlns:ahyp="http://schemas.microsoft.com/office/drawing/2018/hyperlinkcolor">
+  <p:cSld>
+    <p:spTree>
+      <p:nvGrpSpPr>
+        <p:cNvPr id="81" name="Shape 81"/>
+        <p:cNvGrpSpPr/>
+        <p:nvPr/>
+      </p:nvGrpSpPr>
+      <p:grpSpPr>
+        <a:xfrm>
+          <a:off x="0" y="0"/>
+          <a:ext cx="0" cy="0"/>
+          <a:chOff x="0" y="0"/>
+          <a:chExt cx="0" cy="0"/>
+        </a:xfrm>
+      </p:grpSpPr>
+      <p:sp>
+        <p:nvSpPr>
+          <p:cNvPr id="82" name="Google Shape;82;p18"/>
+          <p:cNvSpPr txBox="1"/>
+          <p:nvPr>
+            <p:ph type="title"/>
+          </p:nvPr>
+        </p:nvSpPr>
+        <p:spPr>
+          <a:xfrm>
+            <a:off x="490250" y="450150"/>
+            <a:ext cx="6367800" cy="4090800"/>
+          </a:xfrm>
+          <a:prstGeom prst="rect">
+            <a:avLst/>
+          </a:prstGeom>
+        </p:spPr>
+        <p:txBody>
+          <a:bodyPr anchorCtr="0" anchor="ctr" bIns="91425" lIns="91425" spcFirstLastPara="1" rIns="91425" wrap="square" tIns="91425">
+            <a:normAutofit/>
+          </a:bodyPr>
+          <a:lstStyle/>
+          <a:p>
+            <a:pPr indent="0" lvl="0" marL="0" rtl="0" algn="l">
+              <a:spcBef>
+                <a:spcPts val="0"/>
+              </a:spcBef>
+              <a:spcAft>
+                <a:spcPts val="0"/>
+              </a:spcAft>
+              <a:buNone/>
+            </a:pPr>
+            <a:r>
+              <a:rPr lang="en" sz="4000">
+                <a:solidFill>
+                  <a:srgbClr val="FFFF00"/>
+                </a:solidFill>
+                <a:latin typeface="Roboto Serif"/>
+                <a:ea typeface="Roboto Serif"/>
+                <a:cs typeface="Roboto Serif"/>
+                <a:sym typeface="Roboto Serif"/>
+              </a:rPr>
+              <a:t>Examples</a:t>
+            </a:r>
+            <a:endParaRPr sz="4000"/>
+          </a:p>
+        </p:txBody>
+      </p:sp>
+    </p:spTree>
+  </p:cSld>
+  <p:clrMapOvr>
+    <a:masterClrMapping/>
+  </p:clrMapOvr>
+</p:sld>
+</file>
+
+<file path=ppt/slides/slide7.xml><?xml version="1.0" encoding="utf-8"?>
+<p:sld xmlns:a="http://schemas.openxmlformats.org/drawingml/2006/main" xmlns:r="http://schemas.openxmlformats.org/officeDocument/2006/relationships" xmlns:mc="http://schemas.openxmlformats.org/markup-compatibility/2006" xmlns:mv="urn:schemas-microsoft-com:mac:vml" xmlns:p="http://schemas.openxmlformats.org/presentationml/2006/main" xmlns:c="http://schemas.openxmlformats.org/drawingml/2006/chart" xmlns:dgm="http://schemas.openxmlformats.org/drawingml/2006/diagram" xmlns:o="urn:schemas-microsoft-com:office:office" xmlns:v="urn:schemas-microsoft-com:vml" xmlns:pvml="urn:schemas-microsoft-com:office:powerpoint" xmlns:com="http://schemas.openxmlformats.org/drawingml/2006/compatibility" xmlns:p14="http://schemas.microsoft.com/office/powerpoint/2010/main" xmlns:p15="http://schemas.microsoft.com/office/powerpoint/2012/main" xmlns:ahyp="http://schemas.microsoft.com/office/drawing/2018/hyperlinkcolor">
+  <p:cSld>
+    <p:spTree>
+      <p:nvGrpSpPr>
+        <p:cNvPr id="86" name="Shape 86"/>
+        <p:cNvGrpSpPr/>
+        <p:nvPr/>
+      </p:nvGrpSpPr>
+      <p:grpSpPr>
+        <a:xfrm>
+          <a:off x="0" y="0"/>
+          <a:ext cx="0" cy="0"/>
+          <a:chOff x="0" y="0"/>
+          <a:chExt cx="0" cy="0"/>
+        </a:xfrm>
+      </p:grpSpPr>
+      <p:sp>
+        <p:nvSpPr>
+          <p:cNvPr id="87" name="Google Shape;87;p19"/>
+          <p:cNvSpPr txBox="1"/>
+          <p:nvPr>
+            <p:ph type="title"/>
+          </p:nvPr>
+        </p:nvSpPr>
+        <p:spPr>
+          <a:xfrm>
+            <a:off x="490250" y="450150"/>
+            <a:ext cx="6367800" cy="4090800"/>
+          </a:xfrm>
+          <a:prstGeom prst="rect">
+            <a:avLst/>
+          </a:prstGeom>
+        </p:spPr>
+        <p:txBody>
+          <a:bodyPr anchorCtr="0" anchor="ctr" bIns="91425" lIns="91425" spcFirstLastPara="1" rIns="91425" wrap="square" tIns="91425">
             <a:normAutofit/>
           </a:bodyPr>
           <a:lstStyle/>
@@ -6230,285 +6758,6 @@
 </file>
 
 <file path=ppt/theme/theme1.xml><?xml version="1.0" encoding="utf-8"?>
-<a:theme xmlns:a="http://schemas.openxmlformats.org/drawingml/2006/main" xmlns:r="http://schemas.openxmlformats.org/officeDocument/2006/relationships" name="Spearmint">
-  <a:themeElements>
-    <a:clrScheme name="Spearmint">
-      <a:dk1>
-        <a:srgbClr val="202729"/>
-      </a:dk1>
-      <a:lt1>
-        <a:srgbClr val="FFFFFF"/>
-      </a:lt1>
-      <a:dk2>
-        <a:srgbClr val="4BA173"/>
-      </a:dk2>
-      <a:lt2>
-        <a:srgbClr val="63D297"/>
-      </a:lt2>
-      <a:accent1>
-        <a:srgbClr val="353744"/>
-      </a:accent1>
-      <a:accent2>
-        <a:srgbClr val="424242"/>
-      </a:accent2>
-      <a:accent3>
-        <a:srgbClr val="616161"/>
-      </a:accent3>
-      <a:accent4>
-        <a:srgbClr val="999999"/>
-      </a:accent4>
-      <a:accent5>
-        <a:srgbClr val="FF5252"/>
-      </a:accent5>
-      <a:accent6>
-        <a:srgbClr val="FFF176"/>
-      </a:accent6>
-      <a:hlink>
-        <a:srgbClr val="FF5252"/>
-      </a:hlink>
-      <a:folHlink>
-        <a:srgbClr val="FF5252"/>
-      </a:folHlink>
-    </a:clrScheme>
-    <a:fontScheme name="Office">
-      <a:majorFont>
-        <a:latin typeface="Arial"/>
-        <a:ea typeface=""/>
-        <a:cs typeface=""/>
-        <a:font script="Jpan" typeface="ＭＳ Ｐゴシック"/>
-        <a:font script="Hang" typeface="맑은 고딕"/>
-        <a:font script="Hans" typeface="宋体"/>
-        <a:font script="Hant" typeface="新細明體"/>
-        <a:font script="Arab" typeface="Times New Roman"/>
-        <a:font script="Hebr" typeface="Times New Roman"/>
-        <a:font script="Thai" typeface="Angsana New"/>
-        <a:font script="Ethi" typeface="Nyala"/>
-        <a:font script="Beng" typeface="Vrinda"/>
-        <a:font script="Gujr" typeface="Shruti"/>
-        <a:font script="Khmr" typeface="MoolBoran"/>
-        <a:font script="Knda" typeface="Tunga"/>
-        <a:font script="Guru" typeface="Raavi"/>
-        <a:font script="Cans" typeface="Euphemia"/>
-        <a:font script="Cher" typeface="Plantagenet Cherokee"/>
-        <a:font script="Yiii" typeface="Microsoft Yi Baiti"/>
-        <a:font script="Tibt" typeface="Microsoft Himalaya"/>
-        <a:font script="Thaa" typeface="MV Boli"/>
-        <a:font script="Deva" typeface="Mangal"/>
-        <a:font script="Telu" typeface="Gautami"/>
-        <a:font script="Taml" typeface="Latha"/>
-        <a:font script="Syrc" typeface="Estrangelo Edessa"/>
-        <a:font script="Orya" typeface="Kalinga"/>
-        <a:font script="Mlym" typeface="Kartika"/>
-        <a:font script="Laoo" typeface="DokChampa"/>
-        <a:font script="Sinh" typeface="Iskoola Pota"/>
-        <a:font script="Mong" typeface="Mongolian Baiti"/>
-        <a:font script="Viet" typeface="Times New Roman"/>
-        <a:font script="Uigh" typeface="Microsoft Uighur"/>
-        <a:font script="Geor" typeface="Sylfaen"/>
-      </a:majorFont>
-      <a:minorFont>
-        <a:latin typeface="Arial"/>
-        <a:ea typeface=""/>
-        <a:cs typeface=""/>
-        <a:font script="Jpan" typeface="ＭＳ Ｐゴシック"/>
-        <a:font script="Hang" typeface="맑은 고딕"/>
-        <a:font script="Hans" typeface="宋体"/>
-        <a:font script="Hant" typeface="新細明體"/>
-        <a:font script="Arab" typeface="Arial"/>
-        <a:font script="Hebr" typeface="Arial"/>
-        <a:font script="Thai" typeface="Cordia New"/>
-        <a:font script="Ethi" typeface="Nyala"/>
-        <a:font script="Beng" typeface="Vrinda"/>
-        <a:font script="Gujr" typeface="Shruti"/>
-        <a:font script="Khmr" typeface="DaunPenh"/>
-        <a:font script="Knda" typeface="Tunga"/>
-        <a:font script="Guru" typeface="Raavi"/>
-        <a:font script="Cans" typeface="Euphemia"/>
-        <a:font script="Cher" typeface="Plantagenet Cherokee"/>
-        <a:font script="Yiii" typeface="Microsoft Yi Baiti"/>
-        <a:font script="Tibt" typeface="Microsoft Himalaya"/>
-        <a:font script="Thaa" typeface="MV Boli"/>
-        <a:font script="Deva" typeface="Mangal"/>
-        <a:font script="Telu" typeface="Gautami"/>
-        <a:font script="Taml" typeface="Latha"/>
-        <a:font script="Syrc" typeface="Estrangelo Edessa"/>
-        <a:font script="Orya" typeface="Kalinga"/>
-        <a:font script="Mlym" typeface="Kartika"/>
-        <a:font script="Laoo" typeface="DokChampa"/>
-        <a:font script="Sinh" typeface="Iskoola Pota"/>
-        <a:font script="Mong" typeface="Mongolian Baiti"/>
-        <a:font script="Viet" typeface="Arial"/>
-        <a:font script="Uigh" typeface="Microsoft Uighur"/>
-        <a:font script="Geor" typeface="Sylfaen"/>
-      </a:minorFont>
-    </a:fontScheme>
-    <a:fmtScheme name="Office">
-      <a:fillStyleLst>
-        <a:solidFill>
-          <a:schemeClr val="phClr"/>
-        </a:solidFill>
-        <a:gradFill rotWithShape="1">
-          <a:gsLst>
-            <a:gs pos="0">
-              <a:schemeClr val="phClr">
-                <a:tint val="50000"/>
-                <a:satMod val="300000"/>
-              </a:schemeClr>
-            </a:gs>
-            <a:gs pos="35000">
-              <a:schemeClr val="phClr">
-                <a:tint val="37000"/>
-                <a:satMod val="300000"/>
-              </a:schemeClr>
-            </a:gs>
-            <a:gs pos="100000">
-              <a:schemeClr val="phClr">
-                <a:tint val="15000"/>
-                <a:satMod val="350000"/>
-              </a:schemeClr>
-            </a:gs>
-          </a:gsLst>
-          <a:lin ang="16200000" scaled="1"/>
-        </a:gradFill>
-        <a:gradFill rotWithShape="1">
-          <a:gsLst>
-            <a:gs pos="0">
-              <a:schemeClr val="phClr">
-                <a:tint val="100000"/>
-                <a:shade val="100000"/>
-                <a:satMod val="130000"/>
-              </a:schemeClr>
-            </a:gs>
-            <a:gs pos="100000">
-              <a:schemeClr val="phClr">
-                <a:tint val="50000"/>
-                <a:shade val="100000"/>
-                <a:satMod val="350000"/>
-              </a:schemeClr>
-            </a:gs>
-          </a:gsLst>
-          <a:lin ang="16200000" scaled="0"/>
-        </a:gradFill>
-      </a:fillStyleLst>
-      <a:lnStyleLst>
-        <a:ln w="9525" cap="flat" cmpd="sng" algn="ctr">
-          <a:solidFill>
-            <a:schemeClr val="phClr">
-              <a:shade val="95000"/>
-              <a:satMod val="105000"/>
-            </a:schemeClr>
-          </a:solidFill>
-          <a:prstDash val="solid"/>
-        </a:ln>
-        <a:ln w="25400" cap="flat" cmpd="sng" algn="ctr">
-          <a:solidFill>
-            <a:schemeClr val="phClr"/>
-          </a:solidFill>
-          <a:prstDash val="solid"/>
-        </a:ln>
-        <a:ln w="38100" cap="flat" cmpd="sng" algn="ctr">
-          <a:solidFill>
-            <a:schemeClr val="phClr"/>
-          </a:solidFill>
-          <a:prstDash val="solid"/>
-        </a:ln>
-      </a:lnStyleLst>
-      <a:effectStyleLst>
-        <a:effectStyle>
-          <a:effectLst>
-            <a:outerShdw blurRad="40000" dist="20000" dir="5400000" rotWithShape="0">
-              <a:srgbClr val="000000">
-                <a:alpha val="38000"/>
-              </a:srgbClr>
-            </a:outerShdw>
-          </a:effectLst>
-        </a:effectStyle>
-        <a:effectStyle>
-          <a:effectLst>
-            <a:outerShdw blurRad="40000" dist="23000" dir="5400000" rotWithShape="0">
-              <a:srgbClr val="000000">
-                <a:alpha val="35000"/>
-              </a:srgbClr>
-            </a:outerShdw>
-          </a:effectLst>
-        </a:effectStyle>
-        <a:effectStyle>
-          <a:effectLst>
-            <a:outerShdw blurRad="40000" dist="23000" dir="5400000" rotWithShape="0">
-              <a:srgbClr val="000000">
-                <a:alpha val="35000"/>
-              </a:srgbClr>
-            </a:outerShdw>
-          </a:effectLst>
-          <a:scene3d>
-            <a:camera prst="orthographicFront">
-              <a:rot lat="0" lon="0" rev="0"/>
-            </a:camera>
-            <a:lightRig rig="threePt" dir="t">
-              <a:rot lat="0" lon="0" rev="1200000"/>
-            </a:lightRig>
-          </a:scene3d>
-          <a:sp3d>
-            <a:bevelT w="63500" h="25400"/>
-          </a:sp3d>
-        </a:effectStyle>
-      </a:effectStyleLst>
-      <a:bgFillStyleLst>
-        <a:solidFill>
-          <a:schemeClr val="phClr"/>
-        </a:solidFill>
-        <a:gradFill rotWithShape="1">
-          <a:gsLst>
-            <a:gs pos="0">
-              <a:schemeClr val="phClr">
-                <a:tint val="40000"/>
-                <a:satMod val="350000"/>
-              </a:schemeClr>
-            </a:gs>
-            <a:gs pos="40000">
-              <a:schemeClr val="phClr">
-                <a:tint val="45000"/>
-                <a:shade val="99000"/>
-                <a:satMod val="350000"/>
-              </a:schemeClr>
-            </a:gs>
-            <a:gs pos="100000">
-              <a:schemeClr val="phClr">
-                <a:shade val="20000"/>
-                <a:satMod val="255000"/>
-              </a:schemeClr>
-            </a:gs>
-          </a:gsLst>
-          <a:path path="circle">
-            <a:fillToRect l="50000" t="-80000" r="50000" b="180000"/>
-          </a:path>
-        </a:gradFill>
-        <a:gradFill rotWithShape="1">
-          <a:gsLst>
-            <a:gs pos="0">
-              <a:schemeClr val="phClr">
-                <a:tint val="80000"/>
-                <a:satMod val="300000"/>
-              </a:schemeClr>
-            </a:gs>
-            <a:gs pos="100000">
-              <a:schemeClr val="phClr">
-                <a:shade val="30000"/>
-                <a:satMod val="200000"/>
-              </a:schemeClr>
-            </a:gs>
-          </a:gsLst>
-          <a:path path="circle">
-            <a:fillToRect l="50000" t="50000" r="50000" b="50000"/>
-          </a:path>
-        </a:gradFill>
-      </a:bgFillStyleLst>
-    </a:fmtScheme>
-  </a:themeElements>
-</a:theme>
-</file>
-
-<file path=ppt/theme/theme2.xml><?xml version="1.0" encoding="utf-8"?>
 <a:theme xmlns:a="http://schemas.openxmlformats.org/drawingml/2006/main" xmlns:r="http://schemas.openxmlformats.org/officeDocument/2006/relationships">
   <a:themeElements>
     <a:clrScheme name="Default">
@@ -6785,4 +7034,283 @@
     </a:fmtScheme>
   </a:themeElements>
 </a:theme>
+</file>
+
+<file path=ppt/theme/theme2.xml><?xml version="1.0" encoding="utf-8"?>
+<a:theme xmlns:a="http://schemas.openxmlformats.org/drawingml/2006/main" xmlns:r="http://schemas.openxmlformats.org/officeDocument/2006/relationships" name="Simple Dark">
+  <a:themeElements>
+    <a:clrScheme name="Simple Dark">
+      <a:dk1>
+        <a:srgbClr val="FFFFFF"/>
+      </a:dk1>
+      <a:lt1>
+        <a:srgbClr val="212121"/>
+      </a:lt1>
+      <a:dk2>
+        <a:srgbClr val="303030"/>
+      </a:dk2>
+      <a:lt2>
+        <a:srgbClr val="ADADAD"/>
+      </a:lt2>
+      <a:accent1>
+        <a:srgbClr val="009688"/>
+      </a:accent1>
+      <a:accent2>
+        <a:srgbClr val="EEEEEE"/>
+      </a:accent2>
+      <a:accent3>
+        <a:srgbClr val="78909C"/>
+      </a:accent3>
+      <a:accent4>
+        <a:srgbClr val="FFAB40"/>
+      </a:accent4>
+      <a:accent5>
+        <a:srgbClr val="4DD0E1"/>
+      </a:accent5>
+      <a:accent6>
+        <a:srgbClr val="EEFF41"/>
+      </a:accent6>
+      <a:hlink>
+        <a:srgbClr val="4DD0E1"/>
+      </a:hlink>
+      <a:folHlink>
+        <a:srgbClr val="4DD0E1"/>
+      </a:folHlink>
+    </a:clrScheme>
+    <a:fontScheme name="Office">
+      <a:majorFont>
+        <a:latin typeface="Arial"/>
+        <a:ea typeface=""/>
+        <a:cs typeface=""/>
+        <a:font script="Jpan" typeface="ＭＳ Ｐゴシック"/>
+        <a:font script="Hang" typeface="맑은 고딕"/>
+        <a:font script="Hans" typeface="宋体"/>
+        <a:font script="Hant" typeface="新細明體"/>
+        <a:font script="Arab" typeface="Times New Roman"/>
+        <a:font script="Hebr" typeface="Times New Roman"/>
+        <a:font script="Thai" typeface="Angsana New"/>
+        <a:font script="Ethi" typeface="Nyala"/>
+        <a:font script="Beng" typeface="Vrinda"/>
+        <a:font script="Gujr" typeface="Shruti"/>
+        <a:font script="Khmr" typeface="MoolBoran"/>
+        <a:font script="Knda" typeface="Tunga"/>
+        <a:font script="Guru" typeface="Raavi"/>
+        <a:font script="Cans" typeface="Euphemia"/>
+        <a:font script="Cher" typeface="Plantagenet Cherokee"/>
+        <a:font script="Yiii" typeface="Microsoft Yi Baiti"/>
+        <a:font script="Tibt" typeface="Microsoft Himalaya"/>
+        <a:font script="Thaa" typeface="MV Boli"/>
+        <a:font script="Deva" typeface="Mangal"/>
+        <a:font script="Telu" typeface="Gautami"/>
+        <a:font script="Taml" typeface="Latha"/>
+        <a:font script="Syrc" typeface="Estrangelo Edessa"/>
+        <a:font script="Orya" typeface="Kalinga"/>
+        <a:font script="Mlym" typeface="Kartika"/>
+        <a:font script="Laoo" typeface="DokChampa"/>
+        <a:font script="Sinh" typeface="Iskoola Pota"/>
+        <a:font script="Mong" typeface="Mongolian Baiti"/>
+        <a:font script="Viet" typeface="Times New Roman"/>
+        <a:font script="Uigh" typeface="Microsoft Uighur"/>
+        <a:font script="Geor" typeface="Sylfaen"/>
+      </a:majorFont>
+      <a:minorFont>
+        <a:latin typeface="Arial"/>
+        <a:ea typeface=""/>
+        <a:cs typeface=""/>
+        <a:font script="Jpan" typeface="ＭＳ Ｐゴシック"/>
+        <a:font script="Hang" typeface="맑은 고딕"/>
+        <a:font script="Hans" typeface="宋体"/>
+        <a:font script="Hant" typeface="新細明體"/>
+        <a:font script="Arab" typeface="Arial"/>
+        <a:font script="Hebr" typeface="Arial"/>
+        <a:font script="Thai" typeface="Cordia New"/>
+        <a:font script="Ethi" typeface="Nyala"/>
+        <a:font script="Beng" typeface="Vrinda"/>
+        <a:font script="Gujr" typeface="Shruti"/>
+        <a:font script="Khmr" typeface="DaunPenh"/>
+        <a:font script="Knda" typeface="Tunga"/>
+        <a:font script="Guru" typeface="Raavi"/>
+        <a:font script="Cans" typeface="Euphemia"/>
+        <a:font script="Cher" typeface="Plantagenet Cherokee"/>
+        <a:font script="Yiii" typeface="Microsoft Yi Baiti"/>
+        <a:font script="Tibt" typeface="Microsoft Himalaya"/>
+        <a:font script="Thaa" typeface="MV Boli"/>
+        <a:font script="Deva" typeface="Mangal"/>
+        <a:font script="Telu" typeface="Gautami"/>
+        <a:font script="Taml" typeface="Latha"/>
+        <a:font script="Syrc" typeface="Estrangelo Edessa"/>
+        <a:font script="Orya" typeface="Kalinga"/>
+        <a:font script="Mlym" typeface="Kartika"/>
+        <a:font script="Laoo" typeface="DokChampa"/>
+        <a:font script="Sinh" typeface="Iskoola Pota"/>
+        <a:font script="Mong" typeface="Mongolian Baiti"/>
+        <a:font script="Viet" typeface="Arial"/>
+        <a:font script="Uigh" typeface="Microsoft Uighur"/>
+        <a:font script="Geor" typeface="Sylfaen"/>
+      </a:minorFont>
+    </a:fontScheme>
+    <a:fmtScheme name="Office">
+      <a:fillStyleLst>
+        <a:solidFill>
+          <a:schemeClr val="phClr"/>
+        </a:solidFill>
+        <a:gradFill rotWithShape="1">
+          <a:gsLst>
+            <a:gs pos="0">
+              <a:schemeClr val="phClr">
+                <a:tint val="50000"/>
+                <a:satMod val="300000"/>
+              </a:schemeClr>
+            </a:gs>
+            <a:gs pos="35000">
+              <a:schemeClr val="phClr">
+                <a:tint val="37000"/>
+                <a:satMod val="300000"/>
+              </a:schemeClr>
+            </a:gs>
+            <a:gs pos="100000">
+              <a:schemeClr val="phClr">
+                <a:tint val="15000"/>
+                <a:satMod val="350000"/>
+              </a:schemeClr>
+            </a:gs>
+          </a:gsLst>
+          <a:lin ang="16200000" scaled="1"/>
+        </a:gradFill>
+        <a:gradFill rotWithShape="1">
+          <a:gsLst>
+            <a:gs pos="0">
+              <a:schemeClr val="phClr">
+                <a:tint val="100000"/>
+                <a:shade val="100000"/>
+                <a:satMod val="130000"/>
+              </a:schemeClr>
+            </a:gs>
+            <a:gs pos="100000">
+              <a:schemeClr val="phClr">
+                <a:tint val="50000"/>
+                <a:shade val="100000"/>
+                <a:satMod val="350000"/>
+              </a:schemeClr>
+            </a:gs>
+          </a:gsLst>
+          <a:lin ang="16200000" scaled="0"/>
+        </a:gradFill>
+      </a:fillStyleLst>
+      <a:lnStyleLst>
+        <a:ln w="9525" cap="flat" cmpd="sng" algn="ctr">
+          <a:solidFill>
+            <a:schemeClr val="phClr">
+              <a:shade val="95000"/>
+              <a:satMod val="105000"/>
+            </a:schemeClr>
+          </a:solidFill>
+          <a:prstDash val="solid"/>
+        </a:ln>
+        <a:ln w="25400" cap="flat" cmpd="sng" algn="ctr">
+          <a:solidFill>
+            <a:schemeClr val="phClr"/>
+          </a:solidFill>
+          <a:prstDash val="solid"/>
+        </a:ln>
+        <a:ln w="38100" cap="flat" cmpd="sng" algn="ctr">
+          <a:solidFill>
+            <a:schemeClr val="phClr"/>
+          </a:solidFill>
+          <a:prstDash val="solid"/>
+        </a:ln>
+      </a:lnStyleLst>
+      <a:effectStyleLst>
+        <a:effectStyle>
+          <a:effectLst>
+            <a:outerShdw blurRad="40000" dist="20000" dir="5400000" rotWithShape="0">
+              <a:srgbClr val="000000">
+                <a:alpha val="38000"/>
+              </a:srgbClr>
+            </a:outerShdw>
+          </a:effectLst>
+        </a:effectStyle>
+        <a:effectStyle>
+          <a:effectLst>
+            <a:outerShdw blurRad="40000" dist="23000" dir="5400000" rotWithShape="0">
+              <a:srgbClr val="000000">
+                <a:alpha val="35000"/>
+              </a:srgbClr>
+            </a:outerShdw>
+          </a:effectLst>
+        </a:effectStyle>
+        <a:effectStyle>
+          <a:effectLst>
+            <a:outerShdw blurRad="40000" dist="23000" dir="5400000" rotWithShape="0">
+              <a:srgbClr val="000000">
+                <a:alpha val="35000"/>
+              </a:srgbClr>
+            </a:outerShdw>
+          </a:effectLst>
+          <a:scene3d>
+            <a:camera prst="orthographicFront">
+              <a:rot lat="0" lon="0" rev="0"/>
+            </a:camera>
+            <a:lightRig rig="threePt" dir="t">
+              <a:rot lat="0" lon="0" rev="1200000"/>
+            </a:lightRig>
+          </a:scene3d>
+          <a:sp3d>
+            <a:bevelT w="63500" h="25400"/>
+          </a:sp3d>
+        </a:effectStyle>
+      </a:effectStyleLst>
+      <a:bgFillStyleLst>
+        <a:solidFill>
+          <a:schemeClr val="phClr"/>
+        </a:solidFill>
+        <a:gradFill rotWithShape="1">
+          <a:gsLst>
+            <a:gs pos="0">
+              <a:schemeClr val="phClr">
+                <a:tint val="40000"/>
+                <a:satMod val="350000"/>
+              </a:schemeClr>
+            </a:gs>
+            <a:gs pos="40000">
+              <a:schemeClr val="phClr">
+                <a:tint val="45000"/>
+                <a:shade val="99000"/>
+                <a:satMod val="350000"/>
+              </a:schemeClr>
+            </a:gs>
+            <a:gs pos="100000">
+              <a:schemeClr val="phClr">
+                <a:shade val="20000"/>
+                <a:satMod val="255000"/>
+              </a:schemeClr>
+            </a:gs>
+          </a:gsLst>
+          <a:path path="circle">
+            <a:fillToRect l="50000" t="-80000" r="50000" b="180000"/>
+          </a:path>
+        </a:gradFill>
+        <a:gradFill rotWithShape="1">
+          <a:gsLst>
+            <a:gs pos="0">
+              <a:schemeClr val="phClr">
+                <a:tint val="80000"/>
+                <a:satMod val="300000"/>
+              </a:schemeClr>
+            </a:gs>
+            <a:gs pos="100000">
+              <a:schemeClr val="phClr">
+                <a:shade val="30000"/>
+                <a:satMod val="200000"/>
+              </a:schemeClr>
+            </a:gs>
+          </a:gsLst>
+          <a:path path="circle">
+            <a:fillToRect l="50000" t="50000" r="50000" b="50000"/>
+          </a:path>
+        </a:gradFill>
+      </a:bgFillStyleLst>
+    </a:fmtScheme>
+  </a:themeElements>
+</a:theme>
 </file>
</xml_diff>